<commit_message>
Added an IntelliJ example.
</commit_message>
<xml_diff>
--- a/Socket and Plugs.pptx
+++ b/Socket and Plugs.pptx
@@ -5,7 +5,7 @@
     <p:sldMasterId id="2147483648" r:id="rId1"/>
   </p:sldMasterIdLst>
   <p:notesMasterIdLst>
-    <p:notesMasterId r:id="rId22"/>
+    <p:notesMasterId r:id="rId24"/>
   </p:notesMasterIdLst>
   <p:sldIdLst>
     <p:sldId id="256" r:id="rId2"/>
@@ -19,15 +19,17 @@
     <p:sldId id="275" r:id="rId10"/>
     <p:sldId id="282" r:id="rId11"/>
     <p:sldId id="277" r:id="rId12"/>
-    <p:sldId id="268" r:id="rId13"/>
-    <p:sldId id="264" r:id="rId14"/>
-    <p:sldId id="269" r:id="rId15"/>
-    <p:sldId id="271" r:id="rId16"/>
-    <p:sldId id="270" r:id="rId17"/>
-    <p:sldId id="263" r:id="rId18"/>
-    <p:sldId id="267" r:id="rId19"/>
-    <p:sldId id="262" r:id="rId20"/>
-    <p:sldId id="266" r:id="rId21"/>
+    <p:sldId id="283" r:id="rId13"/>
+    <p:sldId id="284" r:id="rId14"/>
+    <p:sldId id="264" r:id="rId15"/>
+    <p:sldId id="269" r:id="rId16"/>
+    <p:sldId id="268" r:id="rId17"/>
+    <p:sldId id="270" r:id="rId18"/>
+    <p:sldId id="263" r:id="rId19"/>
+    <p:sldId id="267" r:id="rId20"/>
+    <p:sldId id="262" r:id="rId21"/>
+    <p:sldId id="266" r:id="rId22"/>
+    <p:sldId id="271" r:id="rId23"/>
   </p:sldIdLst>
   <p:sldSz cx="12192000" cy="6858000"/>
   <p:notesSz cx="6858000" cy="9144000"/>
@@ -216,7 +218,7 @@
           <a:p>
             <a:fld id="{28B2403D-E2C2-431F-8212-A48F90F0CF07}" type="datetimeFigureOut">
               <a:rPr lang="en-US" smtClean="0"/>
-              <a:t>10/6/2016</a:t>
+              <a:t>10/11/2016</a:t>
             </a:fld>
             <a:endParaRPr lang="en-US"/>
           </a:p>
@@ -763,7 +765,7 @@
     </p:spTree>
     <p:extLst>
       <p:ext uri="{BB962C8B-B14F-4D97-AF65-F5344CB8AC3E}">
-        <p14:creationId xmlns:p14="http://schemas.microsoft.com/office/powerpoint/2010/main" val="4070370988"/>
+        <p14:creationId xmlns:p14="http://schemas.microsoft.com/office/powerpoint/2010/main" val="1732175894"/>
       </p:ext>
     </p:extLst>
   </p:cSld>
@@ -847,7 +849,7 @@
     </p:spTree>
     <p:extLst>
       <p:ext uri="{BB962C8B-B14F-4D97-AF65-F5344CB8AC3E}">
-        <p14:creationId xmlns:p14="http://schemas.microsoft.com/office/powerpoint/2010/main" val="715804568"/>
+        <p14:creationId xmlns:p14="http://schemas.microsoft.com/office/powerpoint/2010/main" val="4070370988"/>
       </p:ext>
     </p:extLst>
   </p:cSld>
@@ -922,7 +924,7 @@
           <a:p>
             <a:fld id="{D601B7DA-7173-45FE-94BD-29A6AF0F60C8}" type="slidenum">
               <a:rPr lang="en-US" smtClean="0"/>
-              <a:t>19</a:t>
+              <a:t>15</a:t>
             </a:fld>
             <a:endParaRPr lang="en-US"/>
           </a:p>
@@ -931,7 +933,7 @@
     </p:spTree>
     <p:extLst>
       <p:ext uri="{BB962C8B-B14F-4D97-AF65-F5344CB8AC3E}">
-        <p14:creationId xmlns:p14="http://schemas.microsoft.com/office/powerpoint/2010/main" val="2070647109"/>
+        <p14:creationId xmlns:p14="http://schemas.microsoft.com/office/powerpoint/2010/main" val="715804568"/>
       </p:ext>
     </p:extLst>
   </p:cSld>
@@ -1007,6 +1009,90 @@
             <a:fld id="{D601B7DA-7173-45FE-94BD-29A6AF0F60C8}" type="slidenum">
               <a:rPr lang="en-US" smtClean="0"/>
               <a:t>20</a:t>
+            </a:fld>
+            <a:endParaRPr lang="en-US"/>
+          </a:p>
+        </p:txBody>
+      </p:sp>
+    </p:spTree>
+    <p:extLst>
+      <p:ext uri="{BB962C8B-B14F-4D97-AF65-F5344CB8AC3E}">
+        <p14:creationId xmlns:p14="http://schemas.microsoft.com/office/powerpoint/2010/main" val="2070647109"/>
+      </p:ext>
+    </p:extLst>
+  </p:cSld>
+  <p:clrMapOvr>
+    <a:masterClrMapping/>
+  </p:clrMapOvr>
+</p:notes>
+</file>
+
+<file path=ppt/notesSlides/notesSlide14.xml><?xml version="1.0" encoding="utf-8"?>
+<p:notes xmlns:a="http://schemas.openxmlformats.org/drawingml/2006/main" xmlns:r="http://schemas.openxmlformats.org/officeDocument/2006/relationships" xmlns:p="http://schemas.openxmlformats.org/presentationml/2006/main">
+  <p:cSld>
+    <p:spTree>
+      <p:nvGrpSpPr>
+        <p:cNvPr id="1" name=""/>
+        <p:cNvGrpSpPr/>
+        <p:nvPr/>
+      </p:nvGrpSpPr>
+      <p:grpSpPr>
+        <a:xfrm>
+          <a:off x="0" y="0"/>
+          <a:ext cx="0" cy="0"/>
+          <a:chOff x="0" y="0"/>
+          <a:chExt cx="0" cy="0"/>
+        </a:xfrm>
+      </p:grpSpPr>
+      <p:sp>
+        <p:nvSpPr>
+          <p:cNvPr id="2" name="Slide Image Placeholder 1"/>
+          <p:cNvSpPr>
+            <a:spLocks noGrp="1" noRot="1" noChangeAspect="1"/>
+          </p:cNvSpPr>
+          <p:nvPr>
+            <p:ph type="sldImg"/>
+          </p:nvPr>
+        </p:nvSpPr>
+        <p:spPr/>
+      </p:sp>
+      <p:sp>
+        <p:nvSpPr>
+          <p:cNvPr id="3" name="Notes Placeholder 2"/>
+          <p:cNvSpPr>
+            <a:spLocks noGrp="1"/>
+          </p:cNvSpPr>
+          <p:nvPr>
+            <p:ph type="body" idx="1"/>
+          </p:nvPr>
+        </p:nvSpPr>
+        <p:spPr/>
+        <p:txBody>
+          <a:bodyPr/>
+          <a:lstStyle/>
+          <a:p>
+            <a:endParaRPr lang="en-US" dirty="0"/>
+          </a:p>
+        </p:txBody>
+      </p:sp>
+      <p:sp>
+        <p:nvSpPr>
+          <p:cNvPr id="4" name="Slide Number Placeholder 3"/>
+          <p:cNvSpPr>
+            <a:spLocks noGrp="1"/>
+          </p:cNvSpPr>
+          <p:nvPr>
+            <p:ph type="sldNum" sz="quarter" idx="10"/>
+          </p:nvPr>
+        </p:nvSpPr>
+        <p:spPr/>
+        <p:txBody>
+          <a:bodyPr/>
+          <a:lstStyle/>
+          <a:p>
+            <a:fld id="{D601B7DA-7173-45FE-94BD-29A6AF0F60C8}" type="slidenum">
+              <a:rPr lang="en-US" smtClean="0"/>
+              <a:t>21</a:t>
             </a:fld>
             <a:endParaRPr lang="en-US"/>
           </a:p>
@@ -1890,7 +1976,7 @@
           <a:p>
             <a:fld id="{4F9F2652-F753-48A1-9C6F-9DBDFA3CE971}" type="datetimeFigureOut">
               <a:rPr lang="en-US" smtClean="0"/>
-              <a:t>10/6/2016</a:t>
+              <a:t>10/11/2016</a:t>
             </a:fld>
             <a:endParaRPr lang="en-US"/>
           </a:p>
@@ -2060,7 +2146,7 @@
           <a:p>
             <a:fld id="{4F9F2652-F753-48A1-9C6F-9DBDFA3CE971}" type="datetimeFigureOut">
               <a:rPr lang="en-US" smtClean="0"/>
-              <a:t>10/6/2016</a:t>
+              <a:t>10/11/2016</a:t>
             </a:fld>
             <a:endParaRPr lang="en-US"/>
           </a:p>
@@ -2240,7 +2326,7 @@
           <a:p>
             <a:fld id="{4F9F2652-F753-48A1-9C6F-9DBDFA3CE971}" type="datetimeFigureOut">
               <a:rPr lang="en-US" smtClean="0"/>
-              <a:t>10/6/2016</a:t>
+              <a:t>10/11/2016</a:t>
             </a:fld>
             <a:endParaRPr lang="en-US"/>
           </a:p>
@@ -2410,7 +2496,7 @@
           <a:p>
             <a:fld id="{4F9F2652-F753-48A1-9C6F-9DBDFA3CE971}" type="datetimeFigureOut">
               <a:rPr lang="en-US" smtClean="0"/>
-              <a:t>10/6/2016</a:t>
+              <a:t>10/11/2016</a:t>
             </a:fld>
             <a:endParaRPr lang="en-US"/>
           </a:p>
@@ -2656,7 +2742,7 @@
           <a:p>
             <a:fld id="{4F9F2652-F753-48A1-9C6F-9DBDFA3CE971}" type="datetimeFigureOut">
               <a:rPr lang="en-US" smtClean="0"/>
-              <a:t>10/6/2016</a:t>
+              <a:t>10/11/2016</a:t>
             </a:fld>
             <a:endParaRPr lang="en-US"/>
           </a:p>
@@ -2888,7 +2974,7 @@
           <a:p>
             <a:fld id="{4F9F2652-F753-48A1-9C6F-9DBDFA3CE971}" type="datetimeFigureOut">
               <a:rPr lang="en-US" smtClean="0"/>
-              <a:t>10/6/2016</a:t>
+              <a:t>10/11/2016</a:t>
             </a:fld>
             <a:endParaRPr lang="en-US"/>
           </a:p>
@@ -3255,7 +3341,7 @@
           <a:p>
             <a:fld id="{4F9F2652-F753-48A1-9C6F-9DBDFA3CE971}" type="datetimeFigureOut">
               <a:rPr lang="en-US" smtClean="0"/>
-              <a:t>10/6/2016</a:t>
+              <a:t>10/11/2016</a:t>
             </a:fld>
             <a:endParaRPr lang="en-US"/>
           </a:p>
@@ -3373,7 +3459,7 @@
           <a:p>
             <a:fld id="{4F9F2652-F753-48A1-9C6F-9DBDFA3CE971}" type="datetimeFigureOut">
               <a:rPr lang="en-US" smtClean="0"/>
-              <a:t>10/6/2016</a:t>
+              <a:t>10/11/2016</a:t>
             </a:fld>
             <a:endParaRPr lang="en-US"/>
           </a:p>
@@ -3468,7 +3554,7 @@
           <a:p>
             <a:fld id="{4F9F2652-F753-48A1-9C6F-9DBDFA3CE971}" type="datetimeFigureOut">
               <a:rPr lang="en-US" smtClean="0"/>
-              <a:t>10/6/2016</a:t>
+              <a:t>10/11/2016</a:t>
             </a:fld>
             <a:endParaRPr lang="en-US"/>
           </a:p>
@@ -3745,7 +3831,7 @@
           <a:p>
             <a:fld id="{4F9F2652-F753-48A1-9C6F-9DBDFA3CE971}" type="datetimeFigureOut">
               <a:rPr lang="en-US" smtClean="0"/>
-              <a:t>10/6/2016</a:t>
+              <a:t>10/11/2016</a:t>
             </a:fld>
             <a:endParaRPr lang="en-US"/>
           </a:p>
@@ -3998,7 +4084,7 @@
           <a:p>
             <a:fld id="{4F9F2652-F753-48A1-9C6F-9DBDFA3CE971}" type="datetimeFigureOut">
               <a:rPr lang="en-US" smtClean="0"/>
-              <a:t>10/6/2016</a:t>
+              <a:t>10/11/2016</a:t>
             </a:fld>
             <a:endParaRPr lang="en-US"/>
           </a:p>
@@ -4211,7 +4297,7 @@
           <a:p>
             <a:fld id="{4F9F2652-F753-48A1-9C6F-9DBDFA3CE971}" type="datetimeFigureOut">
               <a:rPr lang="en-US" smtClean="0"/>
-              <a:t>10/6/2016</a:t>
+              <a:t>10/11/2016</a:t>
             </a:fld>
             <a:endParaRPr lang="en-US"/>
           </a:p>
@@ -4852,13 +4938,8 @@
             <a:pPr algn="l"/>
             <a:r>
               <a:rPr lang="en-US" sz="3600" dirty="0" smtClean="0"/>
-              <a:t>Stability w</a:t>
-            </a:r>
-            <a:r>
-              <a:rPr lang="en-US" sz="3600" dirty="0" smtClean="0"/>
-              <a:t>ithout stagnation</a:t>
-            </a:r>
-            <a:endParaRPr lang="en-US" sz="3600" dirty="0" smtClean="0"/>
+              <a:t>Stability without stagnation</a:t>
+            </a:r>
           </a:p>
         </p:txBody>
       </p:sp>
@@ -5210,14 +5291,22 @@
             <a:pPr lvl="1"/>
             <a:r>
               <a:rPr lang="en-US" dirty="0" smtClean="0"/>
-              <a:t>What it contributes</a:t>
+              <a:t>What it contributes (to a fixed set of contribution points)</a:t>
             </a:r>
           </a:p>
           <a:p>
             <a:pPr lvl="1"/>
             <a:r>
               <a:rPr lang="en-US" dirty="0" smtClean="0"/>
-              <a:t>When to load the code</a:t>
+              <a:t>When to load the code (based on a fixed set of </a:t>
+            </a:r>
+            <a:r>
+              <a:rPr lang="en-US" dirty="0" err="1" smtClean="0"/>
+              <a:t>activationEvents</a:t>
+            </a:r>
+            <a:r>
+              <a:rPr lang="en-US" dirty="0" smtClean="0"/>
+              <a:t>)</a:t>
             </a:r>
           </a:p>
           <a:p>
@@ -5851,12 +5940,116 @@
             <p:ph idx="1"/>
           </p:nvPr>
         </p:nvSpPr>
-        <p:spPr/>
-        <p:txBody>
-          <a:bodyPr/>
+        <p:spPr>
+          <a:xfrm>
+            <a:off x="827183" y="1825625"/>
+            <a:ext cx="10515600" cy="4351338"/>
+          </a:xfrm>
+        </p:spPr>
+        <p:txBody>
+          <a:bodyPr>
+            <a:normAutofit/>
+          </a:bodyPr>
           <a:lstStyle/>
           <a:p>
-            <a:endParaRPr lang="en-US"/>
+            <a:r>
+              <a:rPr lang="en-US" dirty="0" smtClean="0"/>
+              <a:t>Components (eagerly-loaded)</a:t>
+            </a:r>
+            <a:endParaRPr lang="en-US" dirty="0" smtClean="0"/>
+          </a:p>
+          <a:p>
+            <a:pPr lvl="1"/>
+            <a:r>
+              <a:rPr lang="en-US" dirty="0" smtClean="0"/>
+              <a:t>Application, Project, Module</a:t>
+            </a:r>
+          </a:p>
+          <a:p>
+            <a:r>
+              <a:rPr lang="en-US" dirty="0" smtClean="0"/>
+              <a:t>Services (lazily-loaded)</a:t>
+            </a:r>
+            <a:endParaRPr lang="en-US" dirty="0"/>
+          </a:p>
+          <a:p>
+            <a:pPr lvl="1"/>
+            <a:r>
+              <a:rPr lang="en-US" dirty="0" smtClean="0"/>
+              <a:t>Same </a:t>
+            </a:r>
+            <a:r>
+              <a:rPr lang="en-US" dirty="0" smtClean="0"/>
+              <a:t>divisions as c</a:t>
+            </a:r>
+            <a:r>
+              <a:rPr lang="en-US" dirty="0" smtClean="0"/>
+              <a:t>omponents, but loaded lazily</a:t>
+            </a:r>
+            <a:endParaRPr lang="en-US" dirty="0" smtClean="0"/>
+          </a:p>
+          <a:p>
+            <a:r>
+              <a:rPr lang="en-US" dirty="0" smtClean="0"/>
+              <a:t>Actions</a:t>
+            </a:r>
+          </a:p>
+          <a:p>
+            <a:pPr lvl="1"/>
+            <a:r>
+              <a:rPr lang="en-US" dirty="0" smtClean="0"/>
+              <a:t>Declarative similar to </a:t>
+            </a:r>
+            <a:r>
+              <a:rPr lang="en-US" dirty="0" err="1" smtClean="0"/>
+              <a:t>VSCode’s</a:t>
+            </a:r>
+            <a:r>
+              <a:rPr lang="en-US" dirty="0" smtClean="0"/>
+              <a:t> commands</a:t>
+            </a:r>
+          </a:p>
+          <a:p>
+            <a:pPr lvl="1"/>
+            <a:r>
+              <a:rPr lang="en-US" dirty="0"/>
+              <a:t>Used to be lazy-loaded, now eagerly-loaded </a:t>
+            </a:r>
+            <a:r>
+              <a:rPr lang="en-US" dirty="0">
+                <a:hlinkClick r:id="rId2"/>
+              </a:rPr>
+              <a:t>(ref</a:t>
+            </a:r>
+            <a:r>
+              <a:rPr lang="en-US" dirty="0" smtClean="0">
+                <a:hlinkClick r:id="rId2"/>
+              </a:rPr>
+              <a:t>)</a:t>
+            </a:r>
+            <a:endParaRPr lang="en-US" dirty="0" smtClean="0"/>
+          </a:p>
+          <a:p>
+            <a:r>
+              <a:rPr lang="en-US" dirty="0" smtClean="0"/>
+              <a:t>Extension </a:t>
+            </a:r>
+            <a:r>
+              <a:rPr lang="en-US" dirty="0" smtClean="0"/>
+              <a:t>Points and </a:t>
+            </a:r>
+            <a:r>
+              <a:rPr lang="en-US" dirty="0" smtClean="0"/>
+              <a:t>Extensions</a:t>
+            </a:r>
+          </a:p>
+          <a:p>
+            <a:pPr lvl="1"/>
+            <a:endParaRPr lang="en-US" dirty="0"/>
+          </a:p>
+          <a:p>
+            <a:pPr lvl="1"/>
+            <a:endParaRPr lang="en-US" dirty="0" smtClean="0"/>
           </a:p>
         </p:txBody>
       </p:sp>
@@ -5864,208 +6057,6 @@
     <p:extLst>
       <p:ext uri="{BB962C8B-B14F-4D97-AF65-F5344CB8AC3E}">
         <p14:creationId xmlns:p14="http://schemas.microsoft.com/office/powerpoint/2010/main" val="3807927581"/>
-      </p:ext>
-    </p:extLst>
-  </p:cSld>
-  <p:clrMapOvr>
-    <a:masterClrMapping/>
-  </p:clrMapOvr>
-  <p:timing>
-    <p:tnLst>
-      <p:par>
-        <p:cTn id="1" dur="indefinite" restart="never" nodeType="tmRoot"/>
-      </p:par>
-    </p:tnLst>
-  </p:timing>
-</p:sld>
-</file>
-
-<file path=ppt/slides/slide12.xml><?xml version="1.0" encoding="utf-8"?>
-<p:sld xmlns:a="http://schemas.openxmlformats.org/drawingml/2006/main" xmlns:r="http://schemas.openxmlformats.org/officeDocument/2006/relationships" xmlns:p="http://schemas.openxmlformats.org/presentationml/2006/main">
-  <p:cSld>
-    <p:spTree>
-      <p:nvGrpSpPr>
-        <p:cNvPr id="1" name=""/>
-        <p:cNvGrpSpPr/>
-        <p:nvPr/>
-      </p:nvGrpSpPr>
-      <p:grpSpPr>
-        <a:xfrm>
-          <a:off x="0" y="0"/>
-          <a:ext cx="0" cy="0"/>
-          <a:chOff x="0" y="0"/>
-          <a:chExt cx="0" cy="0"/>
-        </a:xfrm>
-      </p:grpSpPr>
-      <p:sp>
-        <p:nvSpPr>
-          <p:cNvPr id="2" name="Title 1"/>
-          <p:cNvSpPr>
-            <a:spLocks noGrp="1"/>
-          </p:cNvSpPr>
-          <p:nvPr>
-            <p:ph type="title"/>
-          </p:nvPr>
-        </p:nvSpPr>
-        <p:spPr/>
-        <p:txBody>
-          <a:bodyPr/>
-          <a:lstStyle/>
-          <a:p>
-            <a:r>
-              <a:rPr lang="en-US" dirty="0" smtClean="0"/>
-              <a:t>Our calculator</a:t>
-            </a:r>
-            <a:endParaRPr lang="en-US" dirty="0"/>
-          </a:p>
-        </p:txBody>
-      </p:sp>
-    </p:spTree>
-    <p:extLst>
-      <p:ext uri="{BB962C8B-B14F-4D97-AF65-F5344CB8AC3E}">
-        <p14:creationId xmlns:p14="http://schemas.microsoft.com/office/powerpoint/2010/main" val="1430427397"/>
-      </p:ext>
-    </p:extLst>
-  </p:cSld>
-  <p:clrMapOvr>
-    <a:masterClrMapping/>
-  </p:clrMapOvr>
-  <p:timing>
-    <p:tnLst>
-      <p:par>
-        <p:cTn id="1" dur="indefinite" restart="never" nodeType="tmRoot"/>
-      </p:par>
-    </p:tnLst>
-  </p:timing>
-</p:sld>
-</file>
-
-<file path=ppt/slides/slide13.xml><?xml version="1.0" encoding="utf-8"?>
-<p:sld xmlns:a="http://schemas.openxmlformats.org/drawingml/2006/main" xmlns:r="http://schemas.openxmlformats.org/officeDocument/2006/relationships" xmlns:p="http://schemas.openxmlformats.org/presentationml/2006/main">
-  <p:cSld>
-    <p:spTree>
-      <p:nvGrpSpPr>
-        <p:cNvPr id="1" name=""/>
-        <p:cNvGrpSpPr/>
-        <p:nvPr/>
-      </p:nvGrpSpPr>
-      <p:grpSpPr>
-        <a:xfrm>
-          <a:off x="0" y="0"/>
-          <a:ext cx="0" cy="0"/>
-          <a:chOff x="0" y="0"/>
-          <a:chExt cx="0" cy="0"/>
-        </a:xfrm>
-      </p:grpSpPr>
-      <p:sp>
-        <p:nvSpPr>
-          <p:cNvPr id="2" name="Title 1"/>
-          <p:cNvSpPr>
-            <a:spLocks noGrp="1"/>
-          </p:cNvSpPr>
-          <p:nvPr>
-            <p:ph type="title"/>
-          </p:nvPr>
-        </p:nvSpPr>
-        <p:spPr/>
-        <p:txBody>
-          <a:bodyPr/>
-          <a:lstStyle/>
-          <a:p>
-            <a:r>
-              <a:rPr lang="en-US" dirty="0" smtClean="0"/>
-              <a:t>Eclipse</a:t>
-            </a:r>
-            <a:endParaRPr lang="en-US" dirty="0"/>
-          </a:p>
-        </p:txBody>
-      </p:sp>
-      <p:pic>
-        <p:nvPicPr>
-          <p:cNvPr id="4" name="Picture 3"/>
-          <p:cNvPicPr>
-            <a:picLocks noChangeAspect="1"/>
-          </p:cNvPicPr>
-          <p:nvPr/>
-        </p:nvPicPr>
-        <p:blipFill>
-          <a:blip r:embed="rId3"/>
-          <a:stretch>
-            <a:fillRect/>
-          </a:stretch>
-        </p:blipFill>
-        <p:spPr>
-          <a:xfrm>
-            <a:off x="7525439" y="365125"/>
-            <a:ext cx="4102471" cy="3745404"/>
-          </a:xfrm>
-          <a:prstGeom prst="rect">
-            <a:avLst/>
-          </a:prstGeom>
-        </p:spPr>
-      </p:pic>
-      <p:pic>
-        <p:nvPicPr>
-          <p:cNvPr id="7" name="Picture 6"/>
-          <p:cNvPicPr>
-            <a:picLocks noChangeAspect="1"/>
-          </p:cNvPicPr>
-          <p:nvPr/>
-        </p:nvPicPr>
-        <p:blipFill>
-          <a:blip r:embed="rId4"/>
-          <a:stretch>
-            <a:fillRect/>
-          </a:stretch>
-        </p:blipFill>
-        <p:spPr>
-          <a:xfrm>
-            <a:off x="4810392" y="4110529"/>
-            <a:ext cx="6951031" cy="2585094"/>
-          </a:xfrm>
-          <a:prstGeom prst="rect">
-            <a:avLst/>
-          </a:prstGeom>
-        </p:spPr>
-      </p:pic>
-      <p:sp>
-        <p:nvSpPr>
-          <p:cNvPr id="9" name="Content Placeholder 2"/>
-          <p:cNvSpPr>
-            <a:spLocks noGrp="1"/>
-          </p:cNvSpPr>
-          <p:nvPr>
-            <p:ph idx="1"/>
-          </p:nvPr>
-        </p:nvSpPr>
-        <p:spPr>
-          <a:xfrm>
-            <a:off x="838200" y="1825625"/>
-            <a:ext cx="10515600" cy="4351338"/>
-          </a:xfrm>
-        </p:spPr>
-        <p:txBody>
-          <a:bodyPr/>
-          <a:lstStyle/>
-          <a:p>
-            <a:r>
-              <a:rPr lang="en-US" dirty="0" smtClean="0"/>
-              <a:t>Socket -&gt; Extension point</a:t>
-            </a:r>
-          </a:p>
-          <a:p>
-            <a:r>
-              <a:rPr lang="en-US" dirty="0" smtClean="0"/>
-              <a:t>Plug -&gt; Extension</a:t>
-            </a:r>
-            <a:endParaRPr lang="en-US" dirty="0" smtClean="0"/>
-          </a:p>
-        </p:txBody>
-      </p:sp>
-    </p:spTree>
-    <p:extLst>
-      <p:ext uri="{BB962C8B-B14F-4D97-AF65-F5344CB8AC3E}">
-        <p14:creationId xmlns:p14="http://schemas.microsoft.com/office/powerpoint/2010/main" val="138427002"/>
       </p:ext>
     </p:extLst>
   </p:cSld>
@@ -6106,9 +6097,40 @@
                                           </p:stCondLst>
                                         </p:cTn>
                                         <p:tgtEl>
-                                          <p:spTgt spid="9">
+                                          <p:spTgt spid="3">
                                             <p:txEl>
                                               <p:pRg st="0" end="0"/>
+                                            </p:txEl>
+                                          </p:spTgt>
+                                        </p:tgtEl>
+                                        <p:attrNameLst>
+                                          <p:attrName>style.visibility</p:attrName>
+                                        </p:attrNameLst>
+                                      </p:cBhvr>
+                                      <p:to>
+                                        <p:strVal val="visible"/>
+                                      </p:to>
+                                    </p:set>
+                                  </p:childTnLst>
+                                </p:cTn>
+                              </p:par>
+                              <p:par>
+                                <p:cTn id="7" presetID="1" presetClass="entr" presetSubtype="0" fill="hold" nodeType="withEffect">
+                                  <p:stCondLst>
+                                    <p:cond delay="0"/>
+                                  </p:stCondLst>
+                                  <p:childTnLst>
+                                    <p:set>
+                                      <p:cBhvr>
+                                        <p:cTn id="8" dur="1" fill="hold">
+                                          <p:stCondLst>
+                                            <p:cond delay="0"/>
+                                          </p:stCondLst>
+                                        </p:cTn>
+                                        <p:tgtEl>
+                                          <p:spTgt spid="3">
+                                            <p:txEl>
+                                              <p:pRg st="1" end="1"/>
                                             </p:txEl>
                                           </p:spTgt>
                                         </p:tgtEl>
@@ -6130,34 +6152,225 @@
                     </p:cTn>
                   </p:par>
                   <p:par>
-                    <p:cTn id="7" fill="hold">
+                    <p:cTn id="9" fill="hold">
                       <p:stCondLst>
                         <p:cond delay="indefinite"/>
                       </p:stCondLst>
                       <p:childTnLst>
                         <p:par>
-                          <p:cTn id="8" fill="hold">
+                          <p:cTn id="10" fill="hold">
                             <p:stCondLst>
                               <p:cond delay="0"/>
                             </p:stCondLst>
                             <p:childTnLst>
                               <p:par>
-                                <p:cTn id="9" presetID="1" presetClass="entr" presetSubtype="0" fill="hold" nodeType="clickEffect">
+                                <p:cTn id="11" presetID="1" presetClass="entr" presetSubtype="0" fill="hold" nodeType="clickEffect">
                                   <p:stCondLst>
                                     <p:cond delay="0"/>
                                   </p:stCondLst>
                                   <p:childTnLst>
                                     <p:set>
                                       <p:cBhvr>
-                                        <p:cTn id="10" dur="1" fill="hold">
+                                        <p:cTn id="12" dur="1" fill="hold">
                                           <p:stCondLst>
                                             <p:cond delay="0"/>
                                           </p:stCondLst>
                                         </p:cTn>
                                         <p:tgtEl>
-                                          <p:spTgt spid="9">
+                                          <p:spTgt spid="3">
                                             <p:txEl>
-                                              <p:pRg st="1" end="1"/>
+                                              <p:pRg st="2" end="2"/>
+                                            </p:txEl>
+                                          </p:spTgt>
+                                        </p:tgtEl>
+                                        <p:attrNameLst>
+                                          <p:attrName>style.visibility</p:attrName>
+                                        </p:attrNameLst>
+                                      </p:cBhvr>
+                                      <p:to>
+                                        <p:strVal val="visible"/>
+                                      </p:to>
+                                    </p:set>
+                                  </p:childTnLst>
+                                </p:cTn>
+                              </p:par>
+                              <p:par>
+                                <p:cTn id="13" presetID="1" presetClass="entr" presetSubtype="0" fill="hold" nodeType="withEffect">
+                                  <p:stCondLst>
+                                    <p:cond delay="0"/>
+                                  </p:stCondLst>
+                                  <p:childTnLst>
+                                    <p:set>
+                                      <p:cBhvr>
+                                        <p:cTn id="14" dur="1" fill="hold">
+                                          <p:stCondLst>
+                                            <p:cond delay="0"/>
+                                          </p:stCondLst>
+                                        </p:cTn>
+                                        <p:tgtEl>
+                                          <p:spTgt spid="3">
+                                            <p:txEl>
+                                              <p:pRg st="3" end="3"/>
+                                            </p:txEl>
+                                          </p:spTgt>
+                                        </p:tgtEl>
+                                        <p:attrNameLst>
+                                          <p:attrName>style.visibility</p:attrName>
+                                        </p:attrNameLst>
+                                      </p:cBhvr>
+                                      <p:to>
+                                        <p:strVal val="visible"/>
+                                      </p:to>
+                                    </p:set>
+                                  </p:childTnLst>
+                                </p:cTn>
+                              </p:par>
+                            </p:childTnLst>
+                          </p:cTn>
+                        </p:par>
+                      </p:childTnLst>
+                    </p:cTn>
+                  </p:par>
+                  <p:par>
+                    <p:cTn id="15" fill="hold">
+                      <p:stCondLst>
+                        <p:cond delay="indefinite"/>
+                      </p:stCondLst>
+                      <p:childTnLst>
+                        <p:par>
+                          <p:cTn id="16" fill="hold">
+                            <p:stCondLst>
+                              <p:cond delay="0"/>
+                            </p:stCondLst>
+                            <p:childTnLst>
+                              <p:par>
+                                <p:cTn id="17" presetID="1" presetClass="entr" presetSubtype="0" fill="hold" nodeType="clickEffect">
+                                  <p:stCondLst>
+                                    <p:cond delay="0"/>
+                                  </p:stCondLst>
+                                  <p:childTnLst>
+                                    <p:set>
+                                      <p:cBhvr>
+                                        <p:cTn id="18" dur="1" fill="hold">
+                                          <p:stCondLst>
+                                            <p:cond delay="0"/>
+                                          </p:stCondLst>
+                                        </p:cTn>
+                                        <p:tgtEl>
+                                          <p:spTgt spid="3">
+                                            <p:txEl>
+                                              <p:pRg st="4" end="4"/>
+                                            </p:txEl>
+                                          </p:spTgt>
+                                        </p:tgtEl>
+                                        <p:attrNameLst>
+                                          <p:attrName>style.visibility</p:attrName>
+                                        </p:attrNameLst>
+                                      </p:cBhvr>
+                                      <p:to>
+                                        <p:strVal val="visible"/>
+                                      </p:to>
+                                    </p:set>
+                                  </p:childTnLst>
+                                </p:cTn>
+                              </p:par>
+                              <p:par>
+                                <p:cTn id="19" presetID="1" presetClass="entr" presetSubtype="0" fill="hold" nodeType="withEffect">
+                                  <p:stCondLst>
+                                    <p:cond delay="0"/>
+                                  </p:stCondLst>
+                                  <p:childTnLst>
+                                    <p:set>
+                                      <p:cBhvr>
+                                        <p:cTn id="20" dur="1" fill="hold">
+                                          <p:stCondLst>
+                                            <p:cond delay="0"/>
+                                          </p:stCondLst>
+                                        </p:cTn>
+                                        <p:tgtEl>
+                                          <p:spTgt spid="3">
+                                            <p:txEl>
+                                              <p:pRg st="5" end="5"/>
+                                            </p:txEl>
+                                          </p:spTgt>
+                                        </p:tgtEl>
+                                        <p:attrNameLst>
+                                          <p:attrName>style.visibility</p:attrName>
+                                        </p:attrNameLst>
+                                      </p:cBhvr>
+                                      <p:to>
+                                        <p:strVal val="visible"/>
+                                      </p:to>
+                                    </p:set>
+                                  </p:childTnLst>
+                                </p:cTn>
+                              </p:par>
+                              <p:par>
+                                <p:cTn id="21" presetID="1" presetClass="entr" presetSubtype="0" fill="hold" nodeType="withEffect">
+                                  <p:stCondLst>
+                                    <p:cond delay="0"/>
+                                  </p:stCondLst>
+                                  <p:childTnLst>
+                                    <p:set>
+                                      <p:cBhvr>
+                                        <p:cTn id="22" dur="1" fill="hold">
+                                          <p:stCondLst>
+                                            <p:cond delay="0"/>
+                                          </p:stCondLst>
+                                        </p:cTn>
+                                        <p:tgtEl>
+                                          <p:spTgt spid="3">
+                                            <p:txEl>
+                                              <p:pRg st="6" end="6"/>
+                                            </p:txEl>
+                                          </p:spTgt>
+                                        </p:tgtEl>
+                                        <p:attrNameLst>
+                                          <p:attrName>style.visibility</p:attrName>
+                                        </p:attrNameLst>
+                                      </p:cBhvr>
+                                      <p:to>
+                                        <p:strVal val="visible"/>
+                                      </p:to>
+                                    </p:set>
+                                  </p:childTnLst>
+                                </p:cTn>
+                              </p:par>
+                            </p:childTnLst>
+                          </p:cTn>
+                        </p:par>
+                      </p:childTnLst>
+                    </p:cTn>
+                  </p:par>
+                  <p:par>
+                    <p:cTn id="23" fill="hold">
+                      <p:stCondLst>
+                        <p:cond delay="indefinite"/>
+                      </p:stCondLst>
+                      <p:childTnLst>
+                        <p:par>
+                          <p:cTn id="24" fill="hold">
+                            <p:stCondLst>
+                              <p:cond delay="0"/>
+                            </p:stCondLst>
+                            <p:childTnLst>
+                              <p:par>
+                                <p:cTn id="25" presetID="1" presetClass="entr" presetSubtype="0" fill="hold" nodeType="clickEffect">
+                                  <p:stCondLst>
+                                    <p:cond delay="0"/>
+                                  </p:stCondLst>
+                                  <p:childTnLst>
+                                    <p:set>
+                                      <p:cBhvr>
+                                        <p:cTn id="26" dur="1" fill="hold">
+                                          <p:stCondLst>
+                                            <p:cond delay="0"/>
+                                          </p:stCondLst>
+                                        </p:cTn>
+                                        <p:tgtEl>
+                                          <p:spTgt spid="3">
+                                            <p:txEl>
+                                              <p:pRg st="7" end="7"/>
                                             </p:txEl>
                                           </p:spTgt>
                                         </p:tgtEl>
@@ -6203,7 +6416,723 @@
 </p:sld>
 </file>
 
+<file path=ppt/slides/slide12.xml><?xml version="1.0" encoding="utf-8"?>
+<p:sld xmlns:a="http://schemas.openxmlformats.org/drawingml/2006/main" xmlns:r="http://schemas.openxmlformats.org/officeDocument/2006/relationships" xmlns:p="http://schemas.openxmlformats.org/presentationml/2006/main">
+  <p:cSld>
+    <p:spTree>
+      <p:nvGrpSpPr>
+        <p:cNvPr id="1" name=""/>
+        <p:cNvGrpSpPr/>
+        <p:nvPr/>
+      </p:nvGrpSpPr>
+      <p:grpSpPr>
+        <a:xfrm>
+          <a:off x="0" y="0"/>
+          <a:ext cx="0" cy="0"/>
+          <a:chOff x="0" y="0"/>
+          <a:chExt cx="0" cy="0"/>
+        </a:xfrm>
+      </p:grpSpPr>
+      <p:sp>
+        <p:nvSpPr>
+          <p:cNvPr id="2" name="Title 1"/>
+          <p:cNvSpPr>
+            <a:spLocks noGrp="1"/>
+          </p:cNvSpPr>
+          <p:nvPr>
+            <p:ph type="title"/>
+          </p:nvPr>
+        </p:nvSpPr>
+        <p:spPr/>
+        <p:txBody>
+          <a:bodyPr/>
+          <a:lstStyle/>
+          <a:p>
+            <a:r>
+              <a:rPr lang="en-US" dirty="0" smtClean="0"/>
+              <a:t>Eclipse</a:t>
+            </a:r>
+            <a:endParaRPr lang="en-US" dirty="0"/>
+          </a:p>
+        </p:txBody>
+      </p:sp>
+      <p:sp>
+        <p:nvSpPr>
+          <p:cNvPr id="3" name="Content Placeholder 2"/>
+          <p:cNvSpPr>
+            <a:spLocks noGrp="1"/>
+          </p:cNvSpPr>
+          <p:nvPr>
+            <p:ph idx="1"/>
+          </p:nvPr>
+        </p:nvSpPr>
+        <p:spPr/>
+        <p:txBody>
+          <a:bodyPr>
+            <a:normAutofit/>
+          </a:bodyPr>
+          <a:lstStyle/>
+          <a:p>
+            <a:r>
+              <a:rPr lang="en-US" dirty="0" smtClean="0"/>
+              <a:t>e4 </a:t>
+            </a:r>
+            <a:endParaRPr lang="en-US" dirty="0"/>
+          </a:p>
+          <a:p>
+            <a:pPr lvl="1"/>
+            <a:r>
+              <a:rPr lang="en-US" dirty="0" smtClean="0"/>
+              <a:t>Modeled workbench</a:t>
+            </a:r>
+          </a:p>
+          <a:p>
+            <a:pPr lvl="1"/>
+            <a:r>
+              <a:rPr lang="en-US" dirty="0" smtClean="0"/>
+              <a:t>Describe application with XML</a:t>
+            </a:r>
+          </a:p>
+          <a:p>
+            <a:pPr lvl="1"/>
+            <a:r>
+              <a:rPr lang="en-US" dirty="0" smtClean="0"/>
+              <a:t>Includes declarative commands/handlers</a:t>
+            </a:r>
+          </a:p>
+          <a:p>
+            <a:r>
+              <a:rPr lang="en-US" dirty="0" smtClean="0"/>
+              <a:t>Sits on top of </a:t>
+            </a:r>
+            <a:r>
+              <a:rPr lang="en-US" dirty="0" err="1" smtClean="0"/>
+              <a:t>OSGi</a:t>
+            </a:r>
+            <a:endParaRPr lang="en-US" dirty="0" smtClean="0"/>
+          </a:p>
+          <a:p>
+            <a:pPr lvl="1"/>
+            <a:r>
+              <a:rPr lang="en-US" dirty="0" smtClean="0"/>
+              <a:t>Services</a:t>
+            </a:r>
+            <a:endParaRPr lang="en-US" dirty="0"/>
+          </a:p>
+          <a:p>
+            <a:pPr lvl="1"/>
+            <a:r>
+              <a:rPr lang="en-US" dirty="0" smtClean="0"/>
+              <a:t>Declarative services</a:t>
+            </a:r>
+          </a:p>
+          <a:p>
+            <a:pPr lvl="1"/>
+            <a:r>
+              <a:rPr lang="en-US" dirty="0" smtClean="0"/>
+              <a:t>Very powerful, very complex</a:t>
+            </a:r>
+            <a:endParaRPr lang="en-US" dirty="0"/>
+          </a:p>
+          <a:p>
+            <a:r>
+              <a:rPr lang="en-US" dirty="0" smtClean="0"/>
+              <a:t>Extension </a:t>
+            </a:r>
+            <a:r>
+              <a:rPr lang="en-US" dirty="0" smtClean="0"/>
+              <a:t>Points and </a:t>
+            </a:r>
+            <a:r>
+              <a:rPr lang="en-US" dirty="0" smtClean="0"/>
+              <a:t>Extensions</a:t>
+            </a:r>
+          </a:p>
+          <a:p>
+            <a:pPr lvl="1"/>
+            <a:endParaRPr lang="en-US" dirty="0" smtClean="0"/>
+          </a:p>
+        </p:txBody>
+      </p:sp>
+    </p:spTree>
+    <p:extLst>
+      <p:ext uri="{BB962C8B-B14F-4D97-AF65-F5344CB8AC3E}">
+        <p14:creationId xmlns:p14="http://schemas.microsoft.com/office/powerpoint/2010/main" val="1235202434"/>
+      </p:ext>
+    </p:extLst>
+  </p:cSld>
+  <p:clrMapOvr>
+    <a:masterClrMapping/>
+  </p:clrMapOvr>
+  <p:timing>
+    <p:tnLst>
+      <p:par>
+        <p:cTn id="1" dur="indefinite" restart="never" nodeType="tmRoot">
+          <p:childTnLst>
+            <p:seq concurrent="1" nextAc="seek">
+              <p:cTn id="2" dur="indefinite" nodeType="mainSeq">
+                <p:childTnLst>
+                  <p:par>
+                    <p:cTn id="3" fill="hold">
+                      <p:stCondLst>
+                        <p:cond delay="indefinite"/>
+                      </p:stCondLst>
+                      <p:childTnLst>
+                        <p:par>
+                          <p:cTn id="4" fill="hold">
+                            <p:stCondLst>
+                              <p:cond delay="0"/>
+                            </p:stCondLst>
+                            <p:childTnLst>
+                              <p:par>
+                                <p:cTn id="5" presetID="1" presetClass="entr" presetSubtype="0" fill="hold" nodeType="clickEffect">
+                                  <p:stCondLst>
+                                    <p:cond delay="0"/>
+                                  </p:stCondLst>
+                                  <p:childTnLst>
+                                    <p:set>
+                                      <p:cBhvr>
+                                        <p:cTn id="6" dur="1" fill="hold">
+                                          <p:stCondLst>
+                                            <p:cond delay="0"/>
+                                          </p:stCondLst>
+                                        </p:cTn>
+                                        <p:tgtEl>
+                                          <p:spTgt spid="3">
+                                            <p:txEl>
+                                              <p:pRg st="0" end="0"/>
+                                            </p:txEl>
+                                          </p:spTgt>
+                                        </p:tgtEl>
+                                        <p:attrNameLst>
+                                          <p:attrName>style.visibility</p:attrName>
+                                        </p:attrNameLst>
+                                      </p:cBhvr>
+                                      <p:to>
+                                        <p:strVal val="visible"/>
+                                      </p:to>
+                                    </p:set>
+                                  </p:childTnLst>
+                                </p:cTn>
+                              </p:par>
+                              <p:par>
+                                <p:cTn id="7" presetID="1" presetClass="entr" presetSubtype="0" fill="hold" nodeType="withEffect">
+                                  <p:stCondLst>
+                                    <p:cond delay="0"/>
+                                  </p:stCondLst>
+                                  <p:childTnLst>
+                                    <p:set>
+                                      <p:cBhvr>
+                                        <p:cTn id="8" dur="1" fill="hold">
+                                          <p:stCondLst>
+                                            <p:cond delay="0"/>
+                                          </p:stCondLst>
+                                        </p:cTn>
+                                        <p:tgtEl>
+                                          <p:spTgt spid="3">
+                                            <p:txEl>
+                                              <p:pRg st="1" end="1"/>
+                                            </p:txEl>
+                                          </p:spTgt>
+                                        </p:tgtEl>
+                                        <p:attrNameLst>
+                                          <p:attrName>style.visibility</p:attrName>
+                                        </p:attrNameLst>
+                                      </p:cBhvr>
+                                      <p:to>
+                                        <p:strVal val="visible"/>
+                                      </p:to>
+                                    </p:set>
+                                  </p:childTnLst>
+                                </p:cTn>
+                              </p:par>
+                              <p:par>
+                                <p:cTn id="9" presetID="1" presetClass="entr" presetSubtype="0" fill="hold" nodeType="withEffect">
+                                  <p:stCondLst>
+                                    <p:cond delay="0"/>
+                                  </p:stCondLst>
+                                  <p:childTnLst>
+                                    <p:set>
+                                      <p:cBhvr>
+                                        <p:cTn id="10" dur="1" fill="hold">
+                                          <p:stCondLst>
+                                            <p:cond delay="0"/>
+                                          </p:stCondLst>
+                                        </p:cTn>
+                                        <p:tgtEl>
+                                          <p:spTgt spid="3">
+                                            <p:txEl>
+                                              <p:pRg st="2" end="2"/>
+                                            </p:txEl>
+                                          </p:spTgt>
+                                        </p:tgtEl>
+                                        <p:attrNameLst>
+                                          <p:attrName>style.visibility</p:attrName>
+                                        </p:attrNameLst>
+                                      </p:cBhvr>
+                                      <p:to>
+                                        <p:strVal val="visible"/>
+                                      </p:to>
+                                    </p:set>
+                                  </p:childTnLst>
+                                </p:cTn>
+                              </p:par>
+                              <p:par>
+                                <p:cTn id="11" presetID="1" presetClass="entr" presetSubtype="0" fill="hold" nodeType="withEffect">
+                                  <p:stCondLst>
+                                    <p:cond delay="0"/>
+                                  </p:stCondLst>
+                                  <p:childTnLst>
+                                    <p:set>
+                                      <p:cBhvr>
+                                        <p:cTn id="12" dur="1" fill="hold">
+                                          <p:stCondLst>
+                                            <p:cond delay="0"/>
+                                          </p:stCondLst>
+                                        </p:cTn>
+                                        <p:tgtEl>
+                                          <p:spTgt spid="3">
+                                            <p:txEl>
+                                              <p:pRg st="3" end="3"/>
+                                            </p:txEl>
+                                          </p:spTgt>
+                                        </p:tgtEl>
+                                        <p:attrNameLst>
+                                          <p:attrName>style.visibility</p:attrName>
+                                        </p:attrNameLst>
+                                      </p:cBhvr>
+                                      <p:to>
+                                        <p:strVal val="visible"/>
+                                      </p:to>
+                                    </p:set>
+                                  </p:childTnLst>
+                                </p:cTn>
+                              </p:par>
+                            </p:childTnLst>
+                          </p:cTn>
+                        </p:par>
+                      </p:childTnLst>
+                    </p:cTn>
+                  </p:par>
+                  <p:par>
+                    <p:cTn id="13" fill="hold">
+                      <p:stCondLst>
+                        <p:cond delay="indefinite"/>
+                      </p:stCondLst>
+                      <p:childTnLst>
+                        <p:par>
+                          <p:cTn id="14" fill="hold">
+                            <p:stCondLst>
+                              <p:cond delay="0"/>
+                            </p:stCondLst>
+                            <p:childTnLst>
+                              <p:par>
+                                <p:cTn id="15" presetID="1" presetClass="entr" presetSubtype="0" fill="hold" nodeType="clickEffect">
+                                  <p:stCondLst>
+                                    <p:cond delay="0"/>
+                                  </p:stCondLst>
+                                  <p:childTnLst>
+                                    <p:set>
+                                      <p:cBhvr>
+                                        <p:cTn id="16" dur="1" fill="hold">
+                                          <p:stCondLst>
+                                            <p:cond delay="0"/>
+                                          </p:stCondLst>
+                                        </p:cTn>
+                                        <p:tgtEl>
+                                          <p:spTgt spid="3">
+                                            <p:txEl>
+                                              <p:pRg st="4" end="4"/>
+                                            </p:txEl>
+                                          </p:spTgt>
+                                        </p:tgtEl>
+                                        <p:attrNameLst>
+                                          <p:attrName>style.visibility</p:attrName>
+                                        </p:attrNameLst>
+                                      </p:cBhvr>
+                                      <p:to>
+                                        <p:strVal val="visible"/>
+                                      </p:to>
+                                    </p:set>
+                                  </p:childTnLst>
+                                </p:cTn>
+                              </p:par>
+                              <p:par>
+                                <p:cTn id="17" presetID="1" presetClass="entr" presetSubtype="0" fill="hold" nodeType="withEffect">
+                                  <p:stCondLst>
+                                    <p:cond delay="0"/>
+                                  </p:stCondLst>
+                                  <p:childTnLst>
+                                    <p:set>
+                                      <p:cBhvr>
+                                        <p:cTn id="18" dur="1" fill="hold">
+                                          <p:stCondLst>
+                                            <p:cond delay="0"/>
+                                          </p:stCondLst>
+                                        </p:cTn>
+                                        <p:tgtEl>
+                                          <p:spTgt spid="3">
+                                            <p:txEl>
+                                              <p:pRg st="5" end="5"/>
+                                            </p:txEl>
+                                          </p:spTgt>
+                                        </p:tgtEl>
+                                        <p:attrNameLst>
+                                          <p:attrName>style.visibility</p:attrName>
+                                        </p:attrNameLst>
+                                      </p:cBhvr>
+                                      <p:to>
+                                        <p:strVal val="visible"/>
+                                      </p:to>
+                                    </p:set>
+                                  </p:childTnLst>
+                                </p:cTn>
+                              </p:par>
+                              <p:par>
+                                <p:cTn id="19" presetID="1" presetClass="entr" presetSubtype="0" fill="hold" nodeType="withEffect">
+                                  <p:stCondLst>
+                                    <p:cond delay="0"/>
+                                  </p:stCondLst>
+                                  <p:childTnLst>
+                                    <p:set>
+                                      <p:cBhvr>
+                                        <p:cTn id="20" dur="1" fill="hold">
+                                          <p:stCondLst>
+                                            <p:cond delay="0"/>
+                                          </p:stCondLst>
+                                        </p:cTn>
+                                        <p:tgtEl>
+                                          <p:spTgt spid="3">
+                                            <p:txEl>
+                                              <p:pRg st="6" end="6"/>
+                                            </p:txEl>
+                                          </p:spTgt>
+                                        </p:tgtEl>
+                                        <p:attrNameLst>
+                                          <p:attrName>style.visibility</p:attrName>
+                                        </p:attrNameLst>
+                                      </p:cBhvr>
+                                      <p:to>
+                                        <p:strVal val="visible"/>
+                                      </p:to>
+                                    </p:set>
+                                  </p:childTnLst>
+                                </p:cTn>
+                              </p:par>
+                              <p:par>
+                                <p:cTn id="21" presetID="1" presetClass="entr" presetSubtype="0" fill="hold" nodeType="withEffect">
+                                  <p:stCondLst>
+                                    <p:cond delay="0"/>
+                                  </p:stCondLst>
+                                  <p:childTnLst>
+                                    <p:set>
+                                      <p:cBhvr>
+                                        <p:cTn id="22" dur="1" fill="hold">
+                                          <p:stCondLst>
+                                            <p:cond delay="0"/>
+                                          </p:stCondLst>
+                                        </p:cTn>
+                                        <p:tgtEl>
+                                          <p:spTgt spid="3">
+                                            <p:txEl>
+                                              <p:pRg st="7" end="7"/>
+                                            </p:txEl>
+                                          </p:spTgt>
+                                        </p:tgtEl>
+                                        <p:attrNameLst>
+                                          <p:attrName>style.visibility</p:attrName>
+                                        </p:attrNameLst>
+                                      </p:cBhvr>
+                                      <p:to>
+                                        <p:strVal val="visible"/>
+                                      </p:to>
+                                    </p:set>
+                                  </p:childTnLst>
+                                </p:cTn>
+                              </p:par>
+                            </p:childTnLst>
+                          </p:cTn>
+                        </p:par>
+                      </p:childTnLst>
+                    </p:cTn>
+                  </p:par>
+                  <p:par>
+                    <p:cTn id="23" fill="hold">
+                      <p:stCondLst>
+                        <p:cond delay="indefinite"/>
+                      </p:stCondLst>
+                      <p:childTnLst>
+                        <p:par>
+                          <p:cTn id="24" fill="hold">
+                            <p:stCondLst>
+                              <p:cond delay="0"/>
+                            </p:stCondLst>
+                            <p:childTnLst>
+                              <p:par>
+                                <p:cTn id="25" presetID="1" presetClass="entr" presetSubtype="0" fill="hold" nodeType="clickEffect">
+                                  <p:stCondLst>
+                                    <p:cond delay="0"/>
+                                  </p:stCondLst>
+                                  <p:childTnLst>
+                                    <p:set>
+                                      <p:cBhvr>
+                                        <p:cTn id="26" dur="1" fill="hold">
+                                          <p:stCondLst>
+                                            <p:cond delay="0"/>
+                                          </p:stCondLst>
+                                        </p:cTn>
+                                        <p:tgtEl>
+                                          <p:spTgt spid="3">
+                                            <p:txEl>
+                                              <p:pRg st="8" end="8"/>
+                                            </p:txEl>
+                                          </p:spTgt>
+                                        </p:tgtEl>
+                                        <p:attrNameLst>
+                                          <p:attrName>style.visibility</p:attrName>
+                                        </p:attrNameLst>
+                                      </p:cBhvr>
+                                      <p:to>
+                                        <p:strVal val="visible"/>
+                                      </p:to>
+                                    </p:set>
+                                  </p:childTnLst>
+                                </p:cTn>
+                              </p:par>
+                            </p:childTnLst>
+                          </p:cTn>
+                        </p:par>
+                      </p:childTnLst>
+                    </p:cTn>
+                  </p:par>
+                </p:childTnLst>
+              </p:cTn>
+              <p:prevCondLst>
+                <p:cond evt="onPrev" delay="0">
+                  <p:tgtEl>
+                    <p:sldTgt/>
+                  </p:tgtEl>
+                </p:cond>
+              </p:prevCondLst>
+              <p:nextCondLst>
+                <p:cond evt="onNext" delay="0">
+                  <p:tgtEl>
+                    <p:sldTgt/>
+                  </p:tgtEl>
+                </p:cond>
+              </p:nextCondLst>
+            </p:seq>
+          </p:childTnLst>
+        </p:cTn>
+      </p:par>
+    </p:tnLst>
+  </p:timing>
+</p:sld>
+</file>
+
+<file path=ppt/slides/slide13.xml><?xml version="1.0" encoding="utf-8"?>
+<p:sld xmlns:a="http://schemas.openxmlformats.org/drawingml/2006/main" xmlns:r="http://schemas.openxmlformats.org/officeDocument/2006/relationships" xmlns:p="http://schemas.openxmlformats.org/presentationml/2006/main">
+  <p:cSld>
+    <p:spTree>
+      <p:nvGrpSpPr>
+        <p:cNvPr id="1" name=""/>
+        <p:cNvGrpSpPr/>
+        <p:nvPr/>
+      </p:nvGrpSpPr>
+      <p:grpSpPr>
+        <a:xfrm>
+          <a:off x="0" y="0"/>
+          <a:ext cx="0" cy="0"/>
+          <a:chOff x="0" y="0"/>
+          <a:chExt cx="0" cy="0"/>
+        </a:xfrm>
+      </p:grpSpPr>
+      <p:sp>
+        <p:nvSpPr>
+          <p:cNvPr id="2" name="Title 1"/>
+          <p:cNvSpPr>
+            <a:spLocks noGrp="1"/>
+          </p:cNvSpPr>
+          <p:nvPr>
+            <p:ph type="title"/>
+          </p:nvPr>
+        </p:nvSpPr>
+        <p:spPr>
+          <a:xfrm>
+            <a:off x="838200" y="365125"/>
+            <a:ext cx="11207496" cy="1325563"/>
+          </a:xfrm>
+        </p:spPr>
+        <p:txBody>
+          <a:bodyPr/>
+          <a:lstStyle/>
+          <a:p>
+            <a:r>
+              <a:rPr lang="en-US" dirty="0" smtClean="0"/>
+              <a:t>Eclipse &amp; IntelliJ – Extension Points &amp; Extensions</a:t>
+            </a:r>
+            <a:endParaRPr lang="en-US" dirty="0"/>
+          </a:p>
+        </p:txBody>
+      </p:sp>
+      <p:sp>
+        <p:nvSpPr>
+          <p:cNvPr id="4" name="Content Placeholder 3"/>
+          <p:cNvSpPr>
+            <a:spLocks noGrp="1"/>
+          </p:cNvSpPr>
+          <p:nvPr>
+            <p:ph idx="1"/>
+          </p:nvPr>
+        </p:nvSpPr>
+        <p:spPr/>
+        <p:txBody>
+          <a:bodyPr/>
+          <a:lstStyle/>
+          <a:p>
+            <a:r>
+              <a:rPr lang="en-US" dirty="0" smtClean="0"/>
+              <a:t>Extension Point defines a Socket</a:t>
+            </a:r>
+          </a:p>
+          <a:p>
+            <a:r>
+              <a:rPr lang="en-US" dirty="0" smtClean="0"/>
+              <a:t>Extension defines a Plug</a:t>
+            </a:r>
+            <a:endParaRPr lang="en-US" dirty="0"/>
+          </a:p>
+        </p:txBody>
+      </p:sp>
+    </p:spTree>
+    <p:extLst>
+      <p:ext uri="{BB962C8B-B14F-4D97-AF65-F5344CB8AC3E}">
+        <p14:creationId xmlns:p14="http://schemas.microsoft.com/office/powerpoint/2010/main" val="3888500666"/>
+      </p:ext>
+    </p:extLst>
+  </p:cSld>
+  <p:clrMapOvr>
+    <a:masterClrMapping/>
+  </p:clrMapOvr>
+  <p:timing>
+    <p:tnLst>
+      <p:par>
+        <p:cTn id="1" dur="indefinite" restart="never" nodeType="tmRoot"/>
+      </p:par>
+    </p:tnLst>
+  </p:timing>
+</p:sld>
+</file>
+
 <file path=ppt/slides/slide14.xml><?xml version="1.0" encoding="utf-8"?>
+<p:sld xmlns:a="http://schemas.openxmlformats.org/drawingml/2006/main" xmlns:r="http://schemas.openxmlformats.org/officeDocument/2006/relationships" xmlns:p="http://schemas.openxmlformats.org/presentationml/2006/main">
+  <p:cSld>
+    <p:spTree>
+      <p:nvGrpSpPr>
+        <p:cNvPr id="1" name=""/>
+        <p:cNvGrpSpPr/>
+        <p:nvPr/>
+      </p:nvGrpSpPr>
+      <p:grpSpPr>
+        <a:xfrm>
+          <a:off x="0" y="0"/>
+          <a:ext cx="0" cy="0"/>
+          <a:chOff x="0" y="0"/>
+          <a:chExt cx="0" cy="0"/>
+        </a:xfrm>
+      </p:grpSpPr>
+      <p:sp>
+        <p:nvSpPr>
+          <p:cNvPr id="2" name="Title 1"/>
+          <p:cNvSpPr>
+            <a:spLocks noGrp="1"/>
+          </p:cNvSpPr>
+          <p:nvPr>
+            <p:ph type="title"/>
+          </p:nvPr>
+        </p:nvSpPr>
+        <p:spPr/>
+        <p:txBody>
+          <a:bodyPr/>
+          <a:lstStyle/>
+          <a:p>
+            <a:r>
+              <a:rPr lang="en-US" dirty="0" smtClean="0"/>
+              <a:t>Eclipse</a:t>
+            </a:r>
+            <a:endParaRPr lang="en-US" dirty="0"/>
+          </a:p>
+        </p:txBody>
+      </p:sp>
+      <p:pic>
+        <p:nvPicPr>
+          <p:cNvPr id="4" name="Picture 3"/>
+          <p:cNvPicPr>
+            <a:picLocks noChangeAspect="1"/>
+          </p:cNvPicPr>
+          <p:nvPr/>
+        </p:nvPicPr>
+        <p:blipFill>
+          <a:blip r:embed="rId3"/>
+          <a:stretch>
+            <a:fillRect/>
+          </a:stretch>
+        </p:blipFill>
+        <p:spPr>
+          <a:xfrm>
+            <a:off x="6357651" y="473726"/>
+            <a:ext cx="4102471" cy="3745404"/>
+          </a:xfrm>
+          <a:prstGeom prst="rect">
+            <a:avLst/>
+          </a:prstGeom>
+        </p:spPr>
+      </p:pic>
+      <p:pic>
+        <p:nvPicPr>
+          <p:cNvPr id="7" name="Picture 6"/>
+          <p:cNvPicPr>
+            <a:picLocks noChangeAspect="1"/>
+          </p:cNvPicPr>
+          <p:nvPr/>
+        </p:nvPicPr>
+        <p:blipFill>
+          <a:blip r:embed="rId4"/>
+          <a:stretch>
+            <a:fillRect/>
+          </a:stretch>
+        </p:blipFill>
+        <p:spPr>
+          <a:xfrm>
+            <a:off x="1075675" y="3174096"/>
+            <a:ext cx="6951031" cy="2585094"/>
+          </a:xfrm>
+          <a:prstGeom prst="rect">
+            <a:avLst/>
+          </a:prstGeom>
+        </p:spPr>
+      </p:pic>
+    </p:spTree>
+    <p:extLst>
+      <p:ext uri="{BB962C8B-B14F-4D97-AF65-F5344CB8AC3E}">
+        <p14:creationId xmlns:p14="http://schemas.microsoft.com/office/powerpoint/2010/main" val="138427002"/>
+      </p:ext>
+    </p:extLst>
+  </p:cSld>
+  <p:clrMapOvr>
+    <a:masterClrMapping/>
+  </p:clrMapOvr>
+  <p:timing>
+    <p:tnLst>
+      <p:par>
+        <p:cTn id="1" dur="indefinite" restart="never" nodeType="tmRoot"/>
+      </p:par>
+    </p:tnLst>
+  </p:timing>
+</p:sld>
+</file>
+
+<file path=ppt/slides/slide15.xml><?xml version="1.0" encoding="utf-8"?>
 <p:sld xmlns:a="http://schemas.openxmlformats.org/drawingml/2006/main" xmlns:r="http://schemas.openxmlformats.org/officeDocument/2006/relationships" xmlns:p="http://schemas.openxmlformats.org/presentationml/2006/main">
   <p:cSld>
     <p:spTree>
@@ -6410,107 +7339,6 @@
 </p:sld>
 </file>
 
-<file path=ppt/slides/slide15.xml><?xml version="1.0" encoding="utf-8"?>
-<p:sld xmlns:a="http://schemas.openxmlformats.org/drawingml/2006/main" xmlns:r="http://schemas.openxmlformats.org/officeDocument/2006/relationships" xmlns:p="http://schemas.openxmlformats.org/presentationml/2006/main">
-  <p:cSld>
-    <p:spTree>
-      <p:nvGrpSpPr>
-        <p:cNvPr id="1" name=""/>
-        <p:cNvGrpSpPr/>
-        <p:nvPr/>
-      </p:nvGrpSpPr>
-      <p:grpSpPr>
-        <a:xfrm>
-          <a:off x="0" y="0"/>
-          <a:ext cx="0" cy="0"/>
-          <a:chOff x="0" y="0"/>
-          <a:chExt cx="0" cy="0"/>
-        </a:xfrm>
-      </p:grpSpPr>
-      <p:sp>
-        <p:nvSpPr>
-          <p:cNvPr id="2" name="Title 1"/>
-          <p:cNvSpPr>
-            <a:spLocks noGrp="1"/>
-          </p:cNvSpPr>
-          <p:nvPr>
-            <p:ph type="title"/>
-          </p:nvPr>
-        </p:nvSpPr>
-        <p:spPr/>
-        <p:txBody>
-          <a:bodyPr/>
-          <a:lstStyle/>
-          <a:p>
-            <a:r>
-              <a:rPr lang="en-US" dirty="0" smtClean="0"/>
-              <a:t>Boilerplate</a:t>
-            </a:r>
-            <a:endParaRPr lang="en-US" dirty="0"/>
-          </a:p>
-        </p:txBody>
-      </p:sp>
-      <p:pic>
-        <p:nvPicPr>
-          <p:cNvPr id="1028" name="Picture 4" descr="http://davelandweb.com/knotts/images/70s/EkTPBKBC_10_70_N12B2.jpg"/>
-          <p:cNvPicPr>
-            <a:picLocks noChangeAspect="1" noChangeArrowheads="1"/>
-          </p:cNvPicPr>
-          <p:nvPr/>
-        </p:nvPicPr>
-        <p:blipFill>
-          <a:blip r:embed="rId2">
-            <a:extLst>
-              <a:ext uri="{28A0092B-C50C-407E-A947-70E740481C1C}">
-                <a14:useLocalDpi xmlns:a14="http://schemas.microsoft.com/office/drawing/2010/main" val="0"/>
-              </a:ext>
-            </a:extLst>
-          </a:blip>
-          <a:srcRect/>
-          <a:stretch>
-            <a:fillRect/>
-          </a:stretch>
-        </p:blipFill>
-        <p:spPr bwMode="auto">
-          <a:xfrm>
-            <a:off x="838200" y="1690688"/>
-            <a:ext cx="6176440" cy="4083314"/>
-          </a:xfrm>
-          <a:prstGeom prst="rect">
-            <a:avLst/>
-          </a:prstGeom>
-          <a:noFill/>
-          <a:extLst>
-            <a:ext uri="{909E8E84-426E-40DD-AFC4-6F175D3DCCD1}">
-              <a14:hiddenFill xmlns:a14="http://schemas.microsoft.com/office/drawing/2010/main">
-                <a:solidFill>
-                  <a:srgbClr val="FFFFFF"/>
-                </a:solidFill>
-              </a14:hiddenFill>
-            </a:ext>
-          </a:extLst>
-        </p:spPr>
-      </p:pic>
-    </p:spTree>
-    <p:extLst>
-      <p:ext uri="{BB962C8B-B14F-4D97-AF65-F5344CB8AC3E}">
-        <p14:creationId xmlns:p14="http://schemas.microsoft.com/office/powerpoint/2010/main" val="1296629721"/>
-      </p:ext>
-    </p:extLst>
-  </p:cSld>
-  <p:clrMapOvr>
-    <a:masterClrMapping/>
-  </p:clrMapOvr>
-  <p:timing>
-    <p:tnLst>
-      <p:par>
-        <p:cTn id="1" dur="indefinite" restart="never" nodeType="tmRoot"/>
-      </p:par>
-    </p:tnLst>
-  </p:timing>
-</p:sld>
-</file>
-
 <file path=ppt/slides/slide16.xml><?xml version="1.0" encoding="utf-8"?>
 <p:sld xmlns:a="http://schemas.openxmlformats.org/drawingml/2006/main" xmlns:r="http://schemas.openxmlformats.org/officeDocument/2006/relationships" xmlns:p="http://schemas.openxmlformats.org/presentationml/2006/main">
   <p:cSld>
@@ -6543,33 +7371,18 @@
           <a:bodyPr/>
           <a:lstStyle/>
           <a:p>
+            <a:r>
+              <a:rPr lang="en-US" dirty="0" smtClean="0"/>
+              <a:t>Our calculator</a:t>
+            </a:r>
             <a:endParaRPr lang="en-US" dirty="0"/>
-          </a:p>
-        </p:txBody>
-      </p:sp>
-      <p:sp>
-        <p:nvSpPr>
-          <p:cNvPr id="3" name="Content Placeholder 2"/>
-          <p:cNvSpPr>
-            <a:spLocks noGrp="1"/>
-          </p:cNvSpPr>
-          <p:nvPr>
-            <p:ph idx="1"/>
-          </p:nvPr>
-        </p:nvSpPr>
-        <p:spPr/>
-        <p:txBody>
-          <a:bodyPr/>
-          <a:lstStyle/>
-          <a:p>
-            <a:endParaRPr lang="en-US"/>
           </a:p>
         </p:txBody>
       </p:sp>
     </p:spTree>
     <p:extLst>
       <p:ext uri="{BB962C8B-B14F-4D97-AF65-F5344CB8AC3E}">
-        <p14:creationId xmlns:p14="http://schemas.microsoft.com/office/powerpoint/2010/main" val="711964191"/>
+        <p14:creationId xmlns:p14="http://schemas.microsoft.com/office/powerpoint/2010/main" val="1430427397"/>
       </p:ext>
     </p:extLst>
   </p:cSld>
@@ -6618,10 +7431,6 @@
           <a:bodyPr/>
           <a:lstStyle/>
           <a:p>
-            <a:r>
-              <a:rPr lang="en-US" dirty="0" smtClean="0"/>
-              <a:t>IntelliJ</a:t>
-            </a:r>
             <a:endParaRPr lang="en-US" dirty="0"/>
           </a:p>
         </p:txBody>
@@ -6648,7 +7457,7 @@
     </p:spTree>
     <p:extLst>
       <p:ext uri="{BB962C8B-B14F-4D97-AF65-F5344CB8AC3E}">
-        <p14:creationId xmlns:p14="http://schemas.microsoft.com/office/powerpoint/2010/main" val="1311018155"/>
+        <p14:creationId xmlns:p14="http://schemas.microsoft.com/office/powerpoint/2010/main" val="711964191"/>
       </p:ext>
     </p:extLst>
   </p:cSld>
@@ -6699,11 +7508,7 @@
           <a:p>
             <a:r>
               <a:rPr lang="en-US" dirty="0" smtClean="0"/>
-              <a:t>Maven vs </a:t>
-            </a:r>
-            <a:r>
-              <a:rPr lang="en-US" dirty="0" err="1" smtClean="0"/>
-              <a:t>Gradle</a:t>
+              <a:t>IntelliJ</a:t>
             </a:r>
             <a:endParaRPr lang="en-US" dirty="0"/>
           </a:p>
@@ -6731,7 +7536,7 @@
     </p:spTree>
     <p:extLst>
       <p:ext uri="{BB962C8B-B14F-4D97-AF65-F5344CB8AC3E}">
-        <p14:creationId xmlns:p14="http://schemas.microsoft.com/office/powerpoint/2010/main" val="1749742386"/>
+        <p14:creationId xmlns:p14="http://schemas.microsoft.com/office/powerpoint/2010/main" val="1311018155"/>
       </p:ext>
     </p:extLst>
   </p:cSld>
@@ -6782,6 +7587,674 @@
           <a:p>
             <a:r>
               <a:rPr lang="en-US" dirty="0" smtClean="0"/>
+              <a:t>Maven vs </a:t>
+            </a:r>
+            <a:r>
+              <a:rPr lang="en-US" dirty="0" err="1" smtClean="0"/>
+              <a:t>Gradle</a:t>
+            </a:r>
+            <a:endParaRPr lang="en-US" dirty="0"/>
+          </a:p>
+        </p:txBody>
+      </p:sp>
+      <p:sp>
+        <p:nvSpPr>
+          <p:cNvPr id="3" name="Content Placeholder 2"/>
+          <p:cNvSpPr>
+            <a:spLocks noGrp="1"/>
+          </p:cNvSpPr>
+          <p:nvPr>
+            <p:ph idx="1"/>
+          </p:nvPr>
+        </p:nvSpPr>
+        <p:spPr/>
+        <p:txBody>
+          <a:bodyPr/>
+          <a:lstStyle/>
+          <a:p>
+            <a:endParaRPr lang="en-US"/>
+          </a:p>
+        </p:txBody>
+      </p:sp>
+    </p:spTree>
+    <p:extLst>
+      <p:ext uri="{BB962C8B-B14F-4D97-AF65-F5344CB8AC3E}">
+        <p14:creationId xmlns:p14="http://schemas.microsoft.com/office/powerpoint/2010/main" val="1749742386"/>
+      </p:ext>
+    </p:extLst>
+  </p:cSld>
+  <p:clrMapOvr>
+    <a:masterClrMapping/>
+  </p:clrMapOvr>
+  <p:timing>
+    <p:tnLst>
+      <p:par>
+        <p:cTn id="1" dur="indefinite" restart="never" nodeType="tmRoot"/>
+      </p:par>
+    </p:tnLst>
+  </p:timing>
+</p:sld>
+</file>
+
+<file path=ppt/slides/slide2.xml><?xml version="1.0" encoding="utf-8"?>
+<p:sld xmlns:a="http://schemas.openxmlformats.org/drawingml/2006/main" xmlns:r="http://schemas.openxmlformats.org/officeDocument/2006/relationships" xmlns:p="http://schemas.openxmlformats.org/presentationml/2006/main">
+  <p:cSld>
+    <p:spTree>
+      <p:nvGrpSpPr>
+        <p:cNvPr id="1" name=""/>
+        <p:cNvGrpSpPr/>
+        <p:nvPr/>
+      </p:nvGrpSpPr>
+      <p:grpSpPr>
+        <a:xfrm>
+          <a:off x="0" y="0"/>
+          <a:ext cx="0" cy="0"/>
+          <a:chOff x="0" y="0"/>
+          <a:chExt cx="0" cy="0"/>
+        </a:xfrm>
+      </p:grpSpPr>
+      <p:sp>
+        <p:nvSpPr>
+          <p:cNvPr id="3" name="Content Placeholder 2"/>
+          <p:cNvSpPr>
+            <a:spLocks noGrp="1"/>
+          </p:cNvSpPr>
+          <p:nvPr>
+            <p:ph idx="1"/>
+          </p:nvPr>
+        </p:nvSpPr>
+        <p:spPr>
+          <a:xfrm>
+            <a:off x="2013858" y="1796597"/>
+            <a:ext cx="1832429" cy="4351338"/>
+          </a:xfrm>
+        </p:spPr>
+        <p:txBody>
+          <a:bodyPr>
+            <a:normAutofit/>
+          </a:bodyPr>
+          <a:lstStyle/>
+          <a:p>
+            <a:pPr marL="0" indent="0">
+              <a:buNone/>
+            </a:pPr>
+            <a:r>
+              <a:rPr lang="en-US" sz="6600" dirty="0" smtClean="0"/>
+              <a:t>1, 1, </a:t>
+            </a:r>
+          </a:p>
+          <a:p>
+            <a:pPr marL="0" indent="0">
+              <a:buNone/>
+            </a:pPr>
+            <a:r>
+              <a:rPr lang="en-US" sz="6600" dirty="0" smtClean="0"/>
+              <a:t>0, 1,</a:t>
+            </a:r>
+          </a:p>
+          <a:p>
+            <a:pPr marL="0" indent="0">
+              <a:buNone/>
+            </a:pPr>
+            <a:r>
+              <a:rPr lang="en-US" sz="6600" dirty="0" smtClean="0"/>
+              <a:t>1, 2,</a:t>
+            </a:r>
+            <a:endParaRPr lang="en-US" sz="4400" dirty="0" smtClean="0"/>
+          </a:p>
+        </p:txBody>
+      </p:sp>
+      <p:sp>
+        <p:nvSpPr>
+          <p:cNvPr id="5" name="Content Placeholder 2"/>
+          <p:cNvSpPr txBox="1">
+            <a:spLocks/>
+          </p:cNvSpPr>
+          <p:nvPr/>
+        </p:nvSpPr>
+        <p:spPr>
+          <a:xfrm>
+            <a:off x="3657601" y="1796597"/>
+            <a:ext cx="7242628" cy="4351338"/>
+          </a:xfrm>
+          <a:prstGeom prst="rect">
+            <a:avLst/>
+          </a:prstGeom>
+        </p:spPr>
+        <p:txBody>
+          <a:bodyPr vert="horz" lIns="91440" tIns="45720" rIns="91440" bIns="45720" rtlCol="0">
+            <a:normAutofit/>
+          </a:bodyPr>
+          <a:lstStyle>
+            <a:lvl1pPr marL="228600" indent="-228600" algn="l" defTabSz="914400" rtl="0" eaLnBrk="1" latinLnBrk="0" hangingPunct="1">
+              <a:lnSpc>
+                <a:spcPct val="90000"/>
+              </a:lnSpc>
+              <a:spcBef>
+                <a:spcPts val="1000"/>
+              </a:spcBef>
+              <a:buFont typeface="Arial" panose="020B0604020202020204" pitchFamily="34" charset="0"/>
+              <a:buChar char="•"/>
+              <a:defRPr sz="2800" kern="1200">
+                <a:solidFill>
+                  <a:schemeClr val="tx1"/>
+                </a:solidFill>
+                <a:latin typeface="+mn-lt"/>
+                <a:ea typeface="+mn-ea"/>
+                <a:cs typeface="+mn-cs"/>
+              </a:defRPr>
+            </a:lvl1pPr>
+            <a:lvl2pPr marL="685800" indent="-228600" algn="l" defTabSz="914400" rtl="0" eaLnBrk="1" latinLnBrk="0" hangingPunct="1">
+              <a:lnSpc>
+                <a:spcPct val="90000"/>
+              </a:lnSpc>
+              <a:spcBef>
+                <a:spcPts val="500"/>
+              </a:spcBef>
+              <a:buFont typeface="Arial" panose="020B0604020202020204" pitchFamily="34" charset="0"/>
+              <a:buChar char="•"/>
+              <a:defRPr sz="2400" kern="1200">
+                <a:solidFill>
+                  <a:schemeClr val="tx1"/>
+                </a:solidFill>
+                <a:latin typeface="+mn-lt"/>
+                <a:ea typeface="+mn-ea"/>
+                <a:cs typeface="+mn-cs"/>
+              </a:defRPr>
+            </a:lvl2pPr>
+            <a:lvl3pPr marL="1143000" indent="-228600" algn="l" defTabSz="914400" rtl="0" eaLnBrk="1" latinLnBrk="0" hangingPunct="1">
+              <a:lnSpc>
+                <a:spcPct val="90000"/>
+              </a:lnSpc>
+              <a:spcBef>
+                <a:spcPts val="500"/>
+              </a:spcBef>
+              <a:buFont typeface="Arial" panose="020B0604020202020204" pitchFamily="34" charset="0"/>
+              <a:buChar char="•"/>
+              <a:defRPr sz="2000" kern="1200">
+                <a:solidFill>
+                  <a:schemeClr val="tx1"/>
+                </a:solidFill>
+                <a:latin typeface="+mn-lt"/>
+                <a:ea typeface="+mn-ea"/>
+                <a:cs typeface="+mn-cs"/>
+              </a:defRPr>
+            </a:lvl3pPr>
+            <a:lvl4pPr marL="1600200" indent="-228600" algn="l" defTabSz="914400" rtl="0" eaLnBrk="1" latinLnBrk="0" hangingPunct="1">
+              <a:lnSpc>
+                <a:spcPct val="90000"/>
+              </a:lnSpc>
+              <a:spcBef>
+                <a:spcPts val="500"/>
+              </a:spcBef>
+              <a:buFont typeface="Arial" panose="020B0604020202020204" pitchFamily="34" charset="0"/>
+              <a:buChar char="•"/>
+              <a:defRPr sz="1800" kern="1200">
+                <a:solidFill>
+                  <a:schemeClr val="tx1"/>
+                </a:solidFill>
+                <a:latin typeface="+mn-lt"/>
+                <a:ea typeface="+mn-ea"/>
+                <a:cs typeface="+mn-cs"/>
+              </a:defRPr>
+            </a:lvl4pPr>
+            <a:lvl5pPr marL="2057400" indent="-228600" algn="l" defTabSz="914400" rtl="0" eaLnBrk="1" latinLnBrk="0" hangingPunct="1">
+              <a:lnSpc>
+                <a:spcPct val="90000"/>
+              </a:lnSpc>
+              <a:spcBef>
+                <a:spcPts val="500"/>
+              </a:spcBef>
+              <a:buFont typeface="Arial" panose="020B0604020202020204" pitchFamily="34" charset="0"/>
+              <a:buChar char="•"/>
+              <a:defRPr sz="1800" kern="1200">
+                <a:solidFill>
+                  <a:schemeClr val="tx1"/>
+                </a:solidFill>
+                <a:latin typeface="+mn-lt"/>
+                <a:ea typeface="+mn-ea"/>
+                <a:cs typeface="+mn-cs"/>
+              </a:defRPr>
+            </a:lvl5pPr>
+            <a:lvl6pPr marL="2514600" indent="-228600" algn="l" defTabSz="914400" rtl="0" eaLnBrk="1" latinLnBrk="0" hangingPunct="1">
+              <a:lnSpc>
+                <a:spcPct val="90000"/>
+              </a:lnSpc>
+              <a:spcBef>
+                <a:spcPts val="500"/>
+              </a:spcBef>
+              <a:buFont typeface="Arial" panose="020B0604020202020204" pitchFamily="34" charset="0"/>
+              <a:buChar char="•"/>
+              <a:defRPr sz="1800" kern="1200">
+                <a:solidFill>
+                  <a:schemeClr val="tx1"/>
+                </a:solidFill>
+                <a:latin typeface="+mn-lt"/>
+                <a:ea typeface="+mn-ea"/>
+                <a:cs typeface="+mn-cs"/>
+              </a:defRPr>
+            </a:lvl6pPr>
+            <a:lvl7pPr marL="2971800" indent="-228600" algn="l" defTabSz="914400" rtl="0" eaLnBrk="1" latinLnBrk="0" hangingPunct="1">
+              <a:lnSpc>
+                <a:spcPct val="90000"/>
+              </a:lnSpc>
+              <a:spcBef>
+                <a:spcPts val="500"/>
+              </a:spcBef>
+              <a:buFont typeface="Arial" panose="020B0604020202020204" pitchFamily="34" charset="0"/>
+              <a:buChar char="•"/>
+              <a:defRPr sz="1800" kern="1200">
+                <a:solidFill>
+                  <a:schemeClr val="tx1"/>
+                </a:solidFill>
+                <a:latin typeface="+mn-lt"/>
+                <a:ea typeface="+mn-ea"/>
+                <a:cs typeface="+mn-cs"/>
+              </a:defRPr>
+            </a:lvl7pPr>
+            <a:lvl8pPr marL="3429000" indent="-228600" algn="l" defTabSz="914400" rtl="0" eaLnBrk="1" latinLnBrk="0" hangingPunct="1">
+              <a:lnSpc>
+                <a:spcPct val="90000"/>
+              </a:lnSpc>
+              <a:spcBef>
+                <a:spcPts val="500"/>
+              </a:spcBef>
+              <a:buFont typeface="Arial" panose="020B0604020202020204" pitchFamily="34" charset="0"/>
+              <a:buChar char="•"/>
+              <a:defRPr sz="1800" kern="1200">
+                <a:solidFill>
+                  <a:schemeClr val="tx1"/>
+                </a:solidFill>
+                <a:latin typeface="+mn-lt"/>
+                <a:ea typeface="+mn-ea"/>
+                <a:cs typeface="+mn-cs"/>
+              </a:defRPr>
+            </a:lvl8pPr>
+            <a:lvl9pPr marL="3886200" indent="-228600" algn="l" defTabSz="914400" rtl="0" eaLnBrk="1" latinLnBrk="0" hangingPunct="1">
+              <a:lnSpc>
+                <a:spcPct val="90000"/>
+              </a:lnSpc>
+              <a:spcBef>
+                <a:spcPts val="500"/>
+              </a:spcBef>
+              <a:buFont typeface="Arial" panose="020B0604020202020204" pitchFamily="34" charset="0"/>
+              <a:buChar char="•"/>
+              <a:defRPr sz="1800" kern="1200">
+                <a:solidFill>
+                  <a:schemeClr val="tx1"/>
+                </a:solidFill>
+                <a:latin typeface="+mn-lt"/>
+                <a:ea typeface="+mn-ea"/>
+                <a:cs typeface="+mn-cs"/>
+              </a:defRPr>
+            </a:lvl9pPr>
+          </a:lstStyle>
+          <a:p>
+            <a:pPr marL="0" indent="0">
+              <a:buNone/>
+            </a:pPr>
+            <a:r>
+              <a:rPr lang="en-US" sz="6600" b="1" dirty="0" smtClean="0"/>
+              <a:t>2   </a:t>
+            </a:r>
+            <a:r>
+              <a:rPr lang="en-US" sz="6600" dirty="0" smtClean="0"/>
+              <a:t>Fibonacci</a:t>
+            </a:r>
+          </a:p>
+          <a:p>
+            <a:pPr marL="0" indent="0">
+              <a:buNone/>
+            </a:pPr>
+            <a:r>
+              <a:rPr lang="en-US" sz="6600" b="1" dirty="0" smtClean="0"/>
+              <a:t>1   </a:t>
+            </a:r>
+            <a:r>
+              <a:rPr lang="en-US" sz="6600" dirty="0" smtClean="0"/>
+              <a:t>Fibonacci again</a:t>
+            </a:r>
+          </a:p>
+          <a:p>
+            <a:pPr marL="0" indent="0">
+              <a:buNone/>
+            </a:pPr>
+            <a:r>
+              <a:rPr lang="en-US" sz="6600" b="1" dirty="0" smtClean="0"/>
+              <a:t>3   </a:t>
+            </a:r>
+            <a:r>
+              <a:rPr lang="en-US" sz="6600" dirty="0" smtClean="0"/>
+              <a:t>Numbers</a:t>
+            </a:r>
+          </a:p>
+          <a:p>
+            <a:endParaRPr lang="en-US" sz="6600" dirty="0"/>
+          </a:p>
+        </p:txBody>
+      </p:sp>
+    </p:spTree>
+    <p:extLst>
+      <p:ext uri="{BB962C8B-B14F-4D97-AF65-F5344CB8AC3E}">
+        <p14:creationId xmlns:p14="http://schemas.microsoft.com/office/powerpoint/2010/main" val="1182917728"/>
+      </p:ext>
+    </p:extLst>
+  </p:cSld>
+  <p:clrMapOvr>
+    <a:masterClrMapping/>
+  </p:clrMapOvr>
+  <p:timing>
+    <p:tnLst>
+      <p:par>
+        <p:cTn id="1" dur="indefinite" restart="never" nodeType="tmRoot">
+          <p:childTnLst>
+            <p:seq concurrent="1" nextAc="seek">
+              <p:cTn id="2" dur="indefinite" nodeType="mainSeq">
+                <p:childTnLst>
+                  <p:par>
+                    <p:cTn id="3" fill="hold">
+                      <p:stCondLst>
+                        <p:cond delay="indefinite"/>
+                      </p:stCondLst>
+                      <p:childTnLst>
+                        <p:par>
+                          <p:cTn id="4" fill="hold">
+                            <p:stCondLst>
+                              <p:cond delay="0"/>
+                            </p:stCondLst>
+                            <p:childTnLst>
+                              <p:par>
+                                <p:cTn id="5" presetID="1" presetClass="entr" presetSubtype="0" fill="hold" nodeType="clickEffect">
+                                  <p:stCondLst>
+                                    <p:cond delay="0"/>
+                                  </p:stCondLst>
+                                  <p:childTnLst>
+                                    <p:set>
+                                      <p:cBhvr>
+                                        <p:cTn id="6" dur="1" fill="hold">
+                                          <p:stCondLst>
+                                            <p:cond delay="0"/>
+                                          </p:stCondLst>
+                                        </p:cTn>
+                                        <p:tgtEl>
+                                          <p:spTgt spid="5">
+                                            <p:txEl>
+                                              <p:pRg st="0" end="0"/>
+                                            </p:txEl>
+                                          </p:spTgt>
+                                        </p:tgtEl>
+                                        <p:attrNameLst>
+                                          <p:attrName>style.visibility</p:attrName>
+                                        </p:attrNameLst>
+                                      </p:cBhvr>
+                                      <p:to>
+                                        <p:strVal val="visible"/>
+                                      </p:to>
+                                    </p:set>
+                                  </p:childTnLst>
+                                </p:cTn>
+                              </p:par>
+                            </p:childTnLst>
+                          </p:cTn>
+                        </p:par>
+                      </p:childTnLst>
+                    </p:cTn>
+                  </p:par>
+                  <p:par>
+                    <p:cTn id="7" fill="hold">
+                      <p:stCondLst>
+                        <p:cond delay="indefinite"/>
+                      </p:stCondLst>
+                      <p:childTnLst>
+                        <p:par>
+                          <p:cTn id="8" fill="hold">
+                            <p:stCondLst>
+                              <p:cond delay="0"/>
+                            </p:stCondLst>
+                            <p:childTnLst>
+                              <p:par>
+                                <p:cTn id="9" presetID="1" presetClass="entr" presetSubtype="0" fill="hold" nodeType="clickEffect">
+                                  <p:stCondLst>
+                                    <p:cond delay="0"/>
+                                  </p:stCondLst>
+                                  <p:childTnLst>
+                                    <p:set>
+                                      <p:cBhvr>
+                                        <p:cTn id="10" dur="1" fill="hold">
+                                          <p:stCondLst>
+                                            <p:cond delay="0"/>
+                                          </p:stCondLst>
+                                        </p:cTn>
+                                        <p:tgtEl>
+                                          <p:spTgt spid="3">
+                                            <p:txEl>
+                                              <p:pRg st="1" end="1"/>
+                                            </p:txEl>
+                                          </p:spTgt>
+                                        </p:tgtEl>
+                                        <p:attrNameLst>
+                                          <p:attrName>style.visibility</p:attrName>
+                                        </p:attrNameLst>
+                                      </p:cBhvr>
+                                      <p:to>
+                                        <p:strVal val="visible"/>
+                                      </p:to>
+                                    </p:set>
+                                  </p:childTnLst>
+                                </p:cTn>
+                              </p:par>
+                            </p:childTnLst>
+                          </p:cTn>
+                        </p:par>
+                      </p:childTnLst>
+                    </p:cTn>
+                  </p:par>
+                  <p:par>
+                    <p:cTn id="11" fill="hold">
+                      <p:stCondLst>
+                        <p:cond delay="indefinite"/>
+                      </p:stCondLst>
+                      <p:childTnLst>
+                        <p:par>
+                          <p:cTn id="12" fill="hold">
+                            <p:stCondLst>
+                              <p:cond delay="0"/>
+                            </p:stCondLst>
+                            <p:childTnLst>
+                              <p:par>
+                                <p:cTn id="13" presetID="1" presetClass="entr" presetSubtype="0" fill="hold" nodeType="clickEffect">
+                                  <p:stCondLst>
+                                    <p:cond delay="0"/>
+                                  </p:stCondLst>
+                                  <p:childTnLst>
+                                    <p:set>
+                                      <p:cBhvr>
+                                        <p:cTn id="14" dur="1" fill="hold">
+                                          <p:stCondLst>
+                                            <p:cond delay="0"/>
+                                          </p:stCondLst>
+                                        </p:cTn>
+                                        <p:tgtEl>
+                                          <p:spTgt spid="5">
+                                            <p:txEl>
+                                              <p:pRg st="1" end="1"/>
+                                            </p:txEl>
+                                          </p:spTgt>
+                                        </p:tgtEl>
+                                        <p:attrNameLst>
+                                          <p:attrName>style.visibility</p:attrName>
+                                        </p:attrNameLst>
+                                      </p:cBhvr>
+                                      <p:to>
+                                        <p:strVal val="visible"/>
+                                      </p:to>
+                                    </p:set>
+                                  </p:childTnLst>
+                                </p:cTn>
+                              </p:par>
+                            </p:childTnLst>
+                          </p:cTn>
+                        </p:par>
+                      </p:childTnLst>
+                    </p:cTn>
+                  </p:par>
+                  <p:par>
+                    <p:cTn id="15" fill="hold">
+                      <p:stCondLst>
+                        <p:cond delay="indefinite"/>
+                      </p:stCondLst>
+                      <p:childTnLst>
+                        <p:par>
+                          <p:cTn id="16" fill="hold">
+                            <p:stCondLst>
+                              <p:cond delay="0"/>
+                            </p:stCondLst>
+                            <p:childTnLst>
+                              <p:par>
+                                <p:cTn id="17" presetID="1" presetClass="entr" presetSubtype="0" fill="hold" nodeType="clickEffect">
+                                  <p:stCondLst>
+                                    <p:cond delay="0"/>
+                                  </p:stCondLst>
+                                  <p:childTnLst>
+                                    <p:set>
+                                      <p:cBhvr>
+                                        <p:cTn id="18" dur="1" fill="hold">
+                                          <p:stCondLst>
+                                            <p:cond delay="0"/>
+                                          </p:stCondLst>
+                                        </p:cTn>
+                                        <p:tgtEl>
+                                          <p:spTgt spid="3">
+                                            <p:txEl>
+                                              <p:pRg st="2" end="2"/>
+                                            </p:txEl>
+                                          </p:spTgt>
+                                        </p:tgtEl>
+                                        <p:attrNameLst>
+                                          <p:attrName>style.visibility</p:attrName>
+                                        </p:attrNameLst>
+                                      </p:cBhvr>
+                                      <p:to>
+                                        <p:strVal val="visible"/>
+                                      </p:to>
+                                    </p:set>
+                                  </p:childTnLst>
+                                </p:cTn>
+                              </p:par>
+                            </p:childTnLst>
+                          </p:cTn>
+                        </p:par>
+                      </p:childTnLst>
+                    </p:cTn>
+                  </p:par>
+                  <p:par>
+                    <p:cTn id="19" fill="hold">
+                      <p:stCondLst>
+                        <p:cond delay="indefinite"/>
+                      </p:stCondLst>
+                      <p:childTnLst>
+                        <p:par>
+                          <p:cTn id="20" fill="hold">
+                            <p:stCondLst>
+                              <p:cond delay="0"/>
+                            </p:stCondLst>
+                            <p:childTnLst>
+                              <p:par>
+                                <p:cTn id="21" presetID="1" presetClass="entr" presetSubtype="0" fill="hold" nodeType="clickEffect">
+                                  <p:stCondLst>
+                                    <p:cond delay="0"/>
+                                  </p:stCondLst>
+                                  <p:childTnLst>
+                                    <p:set>
+                                      <p:cBhvr>
+                                        <p:cTn id="22" dur="1" fill="hold">
+                                          <p:stCondLst>
+                                            <p:cond delay="0"/>
+                                          </p:stCondLst>
+                                        </p:cTn>
+                                        <p:tgtEl>
+                                          <p:spTgt spid="5">
+                                            <p:txEl>
+                                              <p:pRg st="2" end="2"/>
+                                            </p:txEl>
+                                          </p:spTgt>
+                                        </p:tgtEl>
+                                        <p:attrNameLst>
+                                          <p:attrName>style.visibility</p:attrName>
+                                        </p:attrNameLst>
+                                      </p:cBhvr>
+                                      <p:to>
+                                        <p:strVal val="visible"/>
+                                      </p:to>
+                                    </p:set>
+                                  </p:childTnLst>
+                                </p:cTn>
+                              </p:par>
+                            </p:childTnLst>
+                          </p:cTn>
+                        </p:par>
+                      </p:childTnLst>
+                    </p:cTn>
+                  </p:par>
+                </p:childTnLst>
+              </p:cTn>
+              <p:prevCondLst>
+                <p:cond evt="onPrev" delay="0">
+                  <p:tgtEl>
+                    <p:sldTgt/>
+                  </p:tgtEl>
+                </p:cond>
+              </p:prevCondLst>
+              <p:nextCondLst>
+                <p:cond evt="onNext" delay="0">
+                  <p:tgtEl>
+                    <p:sldTgt/>
+                  </p:tgtEl>
+                </p:cond>
+              </p:nextCondLst>
+            </p:seq>
+          </p:childTnLst>
+        </p:cTn>
+      </p:par>
+    </p:tnLst>
+  </p:timing>
+</p:sld>
+</file>
+
+<file path=ppt/slides/slide20.xml><?xml version="1.0" encoding="utf-8"?>
+<p:sld xmlns:a="http://schemas.openxmlformats.org/drawingml/2006/main" xmlns:r="http://schemas.openxmlformats.org/officeDocument/2006/relationships" xmlns:p="http://schemas.openxmlformats.org/presentationml/2006/main">
+  <p:cSld>
+    <p:spTree>
+      <p:nvGrpSpPr>
+        <p:cNvPr id="1" name=""/>
+        <p:cNvGrpSpPr/>
+        <p:nvPr/>
+      </p:nvGrpSpPr>
+      <p:grpSpPr>
+        <a:xfrm>
+          <a:off x="0" y="0"/>
+          <a:ext cx="0" cy="0"/>
+          <a:chOff x="0" y="0"/>
+          <a:chExt cx="0" cy="0"/>
+        </a:xfrm>
+      </p:grpSpPr>
+      <p:sp>
+        <p:nvSpPr>
+          <p:cNvPr id="2" name="Title 1"/>
+          <p:cNvSpPr>
+            <a:spLocks noGrp="1"/>
+          </p:cNvSpPr>
+          <p:nvPr>
+            <p:ph type="title"/>
+          </p:nvPr>
+        </p:nvSpPr>
+        <p:spPr/>
+        <p:txBody>
+          <a:bodyPr/>
+          <a:lstStyle/>
+          <a:p>
+            <a:r>
+              <a:rPr lang="en-US" dirty="0" smtClean="0"/>
               <a:t>Which is more declarative?</a:t>
             </a:r>
             <a:endParaRPr lang="en-US" dirty="0"/>
@@ -7104,9 +8577,6 @@
               </a:rPr>
               <a:t>)</a:t>
             </a:r>
-            <a:endParaRPr lang="en-US" dirty="0" smtClean="0">
-              <a:latin typeface="Consolas" panose="020B0609020204030204" pitchFamily="49" charset="0"/>
-            </a:endParaRPr>
           </a:p>
         </p:txBody>
       </p:sp>
@@ -7754,7 +9224,7 @@
 </p:sld>
 </file>
 
-<file path=ppt/slides/slide2.xml><?xml version="1.0" encoding="utf-8"?>
+<file path=ppt/slides/slide21.xml><?xml version="1.0" encoding="utf-8"?>
 <p:sld xmlns:a="http://schemas.openxmlformats.org/drawingml/2006/main" xmlns:r="http://schemas.openxmlformats.org/officeDocument/2006/relationships" xmlns:p="http://schemas.openxmlformats.org/presentationml/2006/main">
   <p:cSld>
     <p:spTree>
@@ -7773,591 +9243,6 @@
       </p:grpSpPr>
       <p:sp>
         <p:nvSpPr>
-          <p:cNvPr id="3" name="Content Placeholder 2"/>
-          <p:cNvSpPr>
-            <a:spLocks noGrp="1"/>
-          </p:cNvSpPr>
-          <p:nvPr>
-            <p:ph idx="1"/>
-          </p:nvPr>
-        </p:nvSpPr>
-        <p:spPr>
-          <a:xfrm>
-            <a:off x="2013858" y="1796597"/>
-            <a:ext cx="1832429" cy="4351338"/>
-          </a:xfrm>
-        </p:spPr>
-        <p:txBody>
-          <a:bodyPr>
-            <a:normAutofit/>
-          </a:bodyPr>
-          <a:lstStyle/>
-          <a:p>
-            <a:pPr marL="0" indent="0">
-              <a:buNone/>
-            </a:pPr>
-            <a:r>
-              <a:rPr lang="en-US" sz="6600" dirty="0" smtClean="0"/>
-              <a:t>1, 1, </a:t>
-            </a:r>
-          </a:p>
-          <a:p>
-            <a:pPr marL="0" indent="0">
-              <a:buNone/>
-            </a:pPr>
-            <a:r>
-              <a:rPr lang="en-US" sz="6600" dirty="0" smtClean="0"/>
-              <a:t>0, 1,</a:t>
-            </a:r>
-          </a:p>
-          <a:p>
-            <a:pPr marL="0" indent="0">
-              <a:buNone/>
-            </a:pPr>
-            <a:r>
-              <a:rPr lang="en-US" sz="6600" dirty="0" smtClean="0"/>
-              <a:t>1, 2,</a:t>
-            </a:r>
-            <a:endParaRPr lang="en-US" sz="4400" dirty="0" smtClean="0"/>
-          </a:p>
-        </p:txBody>
-      </p:sp>
-      <p:sp>
-        <p:nvSpPr>
-          <p:cNvPr id="5" name="Content Placeholder 2"/>
-          <p:cNvSpPr txBox="1">
-            <a:spLocks/>
-          </p:cNvSpPr>
-          <p:nvPr/>
-        </p:nvSpPr>
-        <p:spPr>
-          <a:xfrm>
-            <a:off x="3657601" y="1796597"/>
-            <a:ext cx="7242628" cy="4351338"/>
-          </a:xfrm>
-          <a:prstGeom prst="rect">
-            <a:avLst/>
-          </a:prstGeom>
-        </p:spPr>
-        <p:txBody>
-          <a:bodyPr vert="horz" lIns="91440" tIns="45720" rIns="91440" bIns="45720" rtlCol="0">
-            <a:normAutofit/>
-          </a:bodyPr>
-          <a:lstStyle>
-            <a:lvl1pPr marL="228600" indent="-228600" algn="l" defTabSz="914400" rtl="0" eaLnBrk="1" latinLnBrk="0" hangingPunct="1">
-              <a:lnSpc>
-                <a:spcPct val="90000"/>
-              </a:lnSpc>
-              <a:spcBef>
-                <a:spcPts val="1000"/>
-              </a:spcBef>
-              <a:buFont typeface="Arial" panose="020B0604020202020204" pitchFamily="34" charset="0"/>
-              <a:buChar char="•"/>
-              <a:defRPr sz="2800" kern="1200">
-                <a:solidFill>
-                  <a:schemeClr val="tx1"/>
-                </a:solidFill>
-                <a:latin typeface="+mn-lt"/>
-                <a:ea typeface="+mn-ea"/>
-                <a:cs typeface="+mn-cs"/>
-              </a:defRPr>
-            </a:lvl1pPr>
-            <a:lvl2pPr marL="685800" indent="-228600" algn="l" defTabSz="914400" rtl="0" eaLnBrk="1" latinLnBrk="0" hangingPunct="1">
-              <a:lnSpc>
-                <a:spcPct val="90000"/>
-              </a:lnSpc>
-              <a:spcBef>
-                <a:spcPts val="500"/>
-              </a:spcBef>
-              <a:buFont typeface="Arial" panose="020B0604020202020204" pitchFamily="34" charset="0"/>
-              <a:buChar char="•"/>
-              <a:defRPr sz="2400" kern="1200">
-                <a:solidFill>
-                  <a:schemeClr val="tx1"/>
-                </a:solidFill>
-                <a:latin typeface="+mn-lt"/>
-                <a:ea typeface="+mn-ea"/>
-                <a:cs typeface="+mn-cs"/>
-              </a:defRPr>
-            </a:lvl2pPr>
-            <a:lvl3pPr marL="1143000" indent="-228600" algn="l" defTabSz="914400" rtl="0" eaLnBrk="1" latinLnBrk="0" hangingPunct="1">
-              <a:lnSpc>
-                <a:spcPct val="90000"/>
-              </a:lnSpc>
-              <a:spcBef>
-                <a:spcPts val="500"/>
-              </a:spcBef>
-              <a:buFont typeface="Arial" panose="020B0604020202020204" pitchFamily="34" charset="0"/>
-              <a:buChar char="•"/>
-              <a:defRPr sz="2000" kern="1200">
-                <a:solidFill>
-                  <a:schemeClr val="tx1"/>
-                </a:solidFill>
-                <a:latin typeface="+mn-lt"/>
-                <a:ea typeface="+mn-ea"/>
-                <a:cs typeface="+mn-cs"/>
-              </a:defRPr>
-            </a:lvl3pPr>
-            <a:lvl4pPr marL="1600200" indent="-228600" algn="l" defTabSz="914400" rtl="0" eaLnBrk="1" latinLnBrk="0" hangingPunct="1">
-              <a:lnSpc>
-                <a:spcPct val="90000"/>
-              </a:lnSpc>
-              <a:spcBef>
-                <a:spcPts val="500"/>
-              </a:spcBef>
-              <a:buFont typeface="Arial" panose="020B0604020202020204" pitchFamily="34" charset="0"/>
-              <a:buChar char="•"/>
-              <a:defRPr sz="1800" kern="1200">
-                <a:solidFill>
-                  <a:schemeClr val="tx1"/>
-                </a:solidFill>
-                <a:latin typeface="+mn-lt"/>
-                <a:ea typeface="+mn-ea"/>
-                <a:cs typeface="+mn-cs"/>
-              </a:defRPr>
-            </a:lvl4pPr>
-            <a:lvl5pPr marL="2057400" indent="-228600" algn="l" defTabSz="914400" rtl="0" eaLnBrk="1" latinLnBrk="0" hangingPunct="1">
-              <a:lnSpc>
-                <a:spcPct val="90000"/>
-              </a:lnSpc>
-              <a:spcBef>
-                <a:spcPts val="500"/>
-              </a:spcBef>
-              <a:buFont typeface="Arial" panose="020B0604020202020204" pitchFamily="34" charset="0"/>
-              <a:buChar char="•"/>
-              <a:defRPr sz="1800" kern="1200">
-                <a:solidFill>
-                  <a:schemeClr val="tx1"/>
-                </a:solidFill>
-                <a:latin typeface="+mn-lt"/>
-                <a:ea typeface="+mn-ea"/>
-                <a:cs typeface="+mn-cs"/>
-              </a:defRPr>
-            </a:lvl5pPr>
-            <a:lvl6pPr marL="2514600" indent="-228600" algn="l" defTabSz="914400" rtl="0" eaLnBrk="1" latinLnBrk="0" hangingPunct="1">
-              <a:lnSpc>
-                <a:spcPct val="90000"/>
-              </a:lnSpc>
-              <a:spcBef>
-                <a:spcPts val="500"/>
-              </a:spcBef>
-              <a:buFont typeface="Arial" panose="020B0604020202020204" pitchFamily="34" charset="0"/>
-              <a:buChar char="•"/>
-              <a:defRPr sz="1800" kern="1200">
-                <a:solidFill>
-                  <a:schemeClr val="tx1"/>
-                </a:solidFill>
-                <a:latin typeface="+mn-lt"/>
-                <a:ea typeface="+mn-ea"/>
-                <a:cs typeface="+mn-cs"/>
-              </a:defRPr>
-            </a:lvl6pPr>
-            <a:lvl7pPr marL="2971800" indent="-228600" algn="l" defTabSz="914400" rtl="0" eaLnBrk="1" latinLnBrk="0" hangingPunct="1">
-              <a:lnSpc>
-                <a:spcPct val="90000"/>
-              </a:lnSpc>
-              <a:spcBef>
-                <a:spcPts val="500"/>
-              </a:spcBef>
-              <a:buFont typeface="Arial" panose="020B0604020202020204" pitchFamily="34" charset="0"/>
-              <a:buChar char="•"/>
-              <a:defRPr sz="1800" kern="1200">
-                <a:solidFill>
-                  <a:schemeClr val="tx1"/>
-                </a:solidFill>
-                <a:latin typeface="+mn-lt"/>
-                <a:ea typeface="+mn-ea"/>
-                <a:cs typeface="+mn-cs"/>
-              </a:defRPr>
-            </a:lvl7pPr>
-            <a:lvl8pPr marL="3429000" indent="-228600" algn="l" defTabSz="914400" rtl="0" eaLnBrk="1" latinLnBrk="0" hangingPunct="1">
-              <a:lnSpc>
-                <a:spcPct val="90000"/>
-              </a:lnSpc>
-              <a:spcBef>
-                <a:spcPts val="500"/>
-              </a:spcBef>
-              <a:buFont typeface="Arial" panose="020B0604020202020204" pitchFamily="34" charset="0"/>
-              <a:buChar char="•"/>
-              <a:defRPr sz="1800" kern="1200">
-                <a:solidFill>
-                  <a:schemeClr val="tx1"/>
-                </a:solidFill>
-                <a:latin typeface="+mn-lt"/>
-                <a:ea typeface="+mn-ea"/>
-                <a:cs typeface="+mn-cs"/>
-              </a:defRPr>
-            </a:lvl8pPr>
-            <a:lvl9pPr marL="3886200" indent="-228600" algn="l" defTabSz="914400" rtl="0" eaLnBrk="1" latinLnBrk="0" hangingPunct="1">
-              <a:lnSpc>
-                <a:spcPct val="90000"/>
-              </a:lnSpc>
-              <a:spcBef>
-                <a:spcPts val="500"/>
-              </a:spcBef>
-              <a:buFont typeface="Arial" panose="020B0604020202020204" pitchFamily="34" charset="0"/>
-              <a:buChar char="•"/>
-              <a:defRPr sz="1800" kern="1200">
-                <a:solidFill>
-                  <a:schemeClr val="tx1"/>
-                </a:solidFill>
-                <a:latin typeface="+mn-lt"/>
-                <a:ea typeface="+mn-ea"/>
-                <a:cs typeface="+mn-cs"/>
-              </a:defRPr>
-            </a:lvl9pPr>
-          </a:lstStyle>
-          <a:p>
-            <a:pPr marL="0" indent="0">
-              <a:buNone/>
-            </a:pPr>
-            <a:r>
-              <a:rPr lang="en-US" sz="6600" b="1" dirty="0" smtClean="0"/>
-              <a:t>2   </a:t>
-            </a:r>
-            <a:r>
-              <a:rPr lang="en-US" sz="6600" dirty="0" smtClean="0"/>
-              <a:t>Fibonacci</a:t>
-            </a:r>
-          </a:p>
-          <a:p>
-            <a:pPr marL="0" indent="0">
-              <a:buNone/>
-            </a:pPr>
-            <a:r>
-              <a:rPr lang="en-US" sz="6600" b="1" dirty="0" smtClean="0"/>
-              <a:t>1   </a:t>
-            </a:r>
-            <a:r>
-              <a:rPr lang="en-US" sz="6600" dirty="0" smtClean="0"/>
-              <a:t>Fibonacci again</a:t>
-            </a:r>
-          </a:p>
-          <a:p>
-            <a:pPr marL="0" indent="0">
-              <a:buNone/>
-            </a:pPr>
-            <a:r>
-              <a:rPr lang="en-US" sz="6600" b="1" dirty="0" smtClean="0"/>
-              <a:t>3   </a:t>
-            </a:r>
-            <a:r>
-              <a:rPr lang="en-US" sz="6600" dirty="0" smtClean="0"/>
-              <a:t>Numbers</a:t>
-            </a:r>
-          </a:p>
-          <a:p>
-            <a:endParaRPr lang="en-US" sz="6600" dirty="0"/>
-          </a:p>
-        </p:txBody>
-      </p:sp>
-    </p:spTree>
-    <p:extLst>
-      <p:ext uri="{BB962C8B-B14F-4D97-AF65-F5344CB8AC3E}">
-        <p14:creationId xmlns:p14="http://schemas.microsoft.com/office/powerpoint/2010/main" val="1182917728"/>
-      </p:ext>
-    </p:extLst>
-  </p:cSld>
-  <p:clrMapOvr>
-    <a:masterClrMapping/>
-  </p:clrMapOvr>
-  <p:timing>
-    <p:tnLst>
-      <p:par>
-        <p:cTn id="1" dur="indefinite" restart="never" nodeType="tmRoot">
-          <p:childTnLst>
-            <p:seq concurrent="1" nextAc="seek">
-              <p:cTn id="2" dur="indefinite" nodeType="mainSeq">
-                <p:childTnLst>
-                  <p:par>
-                    <p:cTn id="3" fill="hold">
-                      <p:stCondLst>
-                        <p:cond delay="indefinite"/>
-                      </p:stCondLst>
-                      <p:childTnLst>
-                        <p:par>
-                          <p:cTn id="4" fill="hold">
-                            <p:stCondLst>
-                              <p:cond delay="0"/>
-                            </p:stCondLst>
-                            <p:childTnLst>
-                              <p:par>
-                                <p:cTn id="5" presetID="1" presetClass="entr" presetSubtype="0" fill="hold" nodeType="clickEffect">
-                                  <p:stCondLst>
-                                    <p:cond delay="0"/>
-                                  </p:stCondLst>
-                                  <p:childTnLst>
-                                    <p:set>
-                                      <p:cBhvr>
-                                        <p:cTn id="6" dur="1" fill="hold">
-                                          <p:stCondLst>
-                                            <p:cond delay="0"/>
-                                          </p:stCondLst>
-                                        </p:cTn>
-                                        <p:tgtEl>
-                                          <p:spTgt spid="5">
-                                            <p:txEl>
-                                              <p:pRg st="0" end="0"/>
-                                            </p:txEl>
-                                          </p:spTgt>
-                                        </p:tgtEl>
-                                        <p:attrNameLst>
-                                          <p:attrName>style.visibility</p:attrName>
-                                        </p:attrNameLst>
-                                      </p:cBhvr>
-                                      <p:to>
-                                        <p:strVal val="visible"/>
-                                      </p:to>
-                                    </p:set>
-                                  </p:childTnLst>
-                                </p:cTn>
-                              </p:par>
-                            </p:childTnLst>
-                          </p:cTn>
-                        </p:par>
-                      </p:childTnLst>
-                    </p:cTn>
-                  </p:par>
-                  <p:par>
-                    <p:cTn id="7" fill="hold">
-                      <p:stCondLst>
-                        <p:cond delay="indefinite"/>
-                      </p:stCondLst>
-                      <p:childTnLst>
-                        <p:par>
-                          <p:cTn id="8" fill="hold">
-                            <p:stCondLst>
-                              <p:cond delay="0"/>
-                            </p:stCondLst>
-                            <p:childTnLst>
-                              <p:par>
-                                <p:cTn id="9" presetID="1" presetClass="entr" presetSubtype="0" fill="hold" nodeType="clickEffect">
-                                  <p:stCondLst>
-                                    <p:cond delay="0"/>
-                                  </p:stCondLst>
-                                  <p:childTnLst>
-                                    <p:set>
-                                      <p:cBhvr>
-                                        <p:cTn id="10" dur="1" fill="hold">
-                                          <p:stCondLst>
-                                            <p:cond delay="0"/>
-                                          </p:stCondLst>
-                                        </p:cTn>
-                                        <p:tgtEl>
-                                          <p:spTgt spid="3">
-                                            <p:txEl>
-                                              <p:pRg st="1" end="1"/>
-                                            </p:txEl>
-                                          </p:spTgt>
-                                        </p:tgtEl>
-                                        <p:attrNameLst>
-                                          <p:attrName>style.visibility</p:attrName>
-                                        </p:attrNameLst>
-                                      </p:cBhvr>
-                                      <p:to>
-                                        <p:strVal val="visible"/>
-                                      </p:to>
-                                    </p:set>
-                                  </p:childTnLst>
-                                </p:cTn>
-                              </p:par>
-                            </p:childTnLst>
-                          </p:cTn>
-                        </p:par>
-                      </p:childTnLst>
-                    </p:cTn>
-                  </p:par>
-                  <p:par>
-                    <p:cTn id="11" fill="hold">
-                      <p:stCondLst>
-                        <p:cond delay="indefinite"/>
-                      </p:stCondLst>
-                      <p:childTnLst>
-                        <p:par>
-                          <p:cTn id="12" fill="hold">
-                            <p:stCondLst>
-                              <p:cond delay="0"/>
-                            </p:stCondLst>
-                            <p:childTnLst>
-                              <p:par>
-                                <p:cTn id="13" presetID="1" presetClass="entr" presetSubtype="0" fill="hold" nodeType="clickEffect">
-                                  <p:stCondLst>
-                                    <p:cond delay="0"/>
-                                  </p:stCondLst>
-                                  <p:childTnLst>
-                                    <p:set>
-                                      <p:cBhvr>
-                                        <p:cTn id="14" dur="1" fill="hold">
-                                          <p:stCondLst>
-                                            <p:cond delay="0"/>
-                                          </p:stCondLst>
-                                        </p:cTn>
-                                        <p:tgtEl>
-                                          <p:spTgt spid="5">
-                                            <p:txEl>
-                                              <p:pRg st="1" end="1"/>
-                                            </p:txEl>
-                                          </p:spTgt>
-                                        </p:tgtEl>
-                                        <p:attrNameLst>
-                                          <p:attrName>style.visibility</p:attrName>
-                                        </p:attrNameLst>
-                                      </p:cBhvr>
-                                      <p:to>
-                                        <p:strVal val="visible"/>
-                                      </p:to>
-                                    </p:set>
-                                  </p:childTnLst>
-                                </p:cTn>
-                              </p:par>
-                            </p:childTnLst>
-                          </p:cTn>
-                        </p:par>
-                      </p:childTnLst>
-                    </p:cTn>
-                  </p:par>
-                  <p:par>
-                    <p:cTn id="15" fill="hold">
-                      <p:stCondLst>
-                        <p:cond delay="indefinite"/>
-                      </p:stCondLst>
-                      <p:childTnLst>
-                        <p:par>
-                          <p:cTn id="16" fill="hold">
-                            <p:stCondLst>
-                              <p:cond delay="0"/>
-                            </p:stCondLst>
-                            <p:childTnLst>
-                              <p:par>
-                                <p:cTn id="17" presetID="1" presetClass="entr" presetSubtype="0" fill="hold" nodeType="clickEffect">
-                                  <p:stCondLst>
-                                    <p:cond delay="0"/>
-                                  </p:stCondLst>
-                                  <p:childTnLst>
-                                    <p:set>
-                                      <p:cBhvr>
-                                        <p:cTn id="18" dur="1" fill="hold">
-                                          <p:stCondLst>
-                                            <p:cond delay="0"/>
-                                          </p:stCondLst>
-                                        </p:cTn>
-                                        <p:tgtEl>
-                                          <p:spTgt spid="3">
-                                            <p:txEl>
-                                              <p:pRg st="2" end="2"/>
-                                            </p:txEl>
-                                          </p:spTgt>
-                                        </p:tgtEl>
-                                        <p:attrNameLst>
-                                          <p:attrName>style.visibility</p:attrName>
-                                        </p:attrNameLst>
-                                      </p:cBhvr>
-                                      <p:to>
-                                        <p:strVal val="visible"/>
-                                      </p:to>
-                                    </p:set>
-                                  </p:childTnLst>
-                                </p:cTn>
-                              </p:par>
-                            </p:childTnLst>
-                          </p:cTn>
-                        </p:par>
-                      </p:childTnLst>
-                    </p:cTn>
-                  </p:par>
-                  <p:par>
-                    <p:cTn id="19" fill="hold">
-                      <p:stCondLst>
-                        <p:cond delay="indefinite"/>
-                      </p:stCondLst>
-                      <p:childTnLst>
-                        <p:par>
-                          <p:cTn id="20" fill="hold">
-                            <p:stCondLst>
-                              <p:cond delay="0"/>
-                            </p:stCondLst>
-                            <p:childTnLst>
-                              <p:par>
-                                <p:cTn id="21" presetID="1" presetClass="entr" presetSubtype="0" fill="hold" nodeType="clickEffect">
-                                  <p:stCondLst>
-                                    <p:cond delay="0"/>
-                                  </p:stCondLst>
-                                  <p:childTnLst>
-                                    <p:set>
-                                      <p:cBhvr>
-                                        <p:cTn id="22" dur="1" fill="hold">
-                                          <p:stCondLst>
-                                            <p:cond delay="0"/>
-                                          </p:stCondLst>
-                                        </p:cTn>
-                                        <p:tgtEl>
-                                          <p:spTgt spid="5">
-                                            <p:txEl>
-                                              <p:pRg st="2" end="2"/>
-                                            </p:txEl>
-                                          </p:spTgt>
-                                        </p:tgtEl>
-                                        <p:attrNameLst>
-                                          <p:attrName>style.visibility</p:attrName>
-                                        </p:attrNameLst>
-                                      </p:cBhvr>
-                                      <p:to>
-                                        <p:strVal val="visible"/>
-                                      </p:to>
-                                    </p:set>
-                                  </p:childTnLst>
-                                </p:cTn>
-                              </p:par>
-                            </p:childTnLst>
-                          </p:cTn>
-                        </p:par>
-                      </p:childTnLst>
-                    </p:cTn>
-                  </p:par>
-                </p:childTnLst>
-              </p:cTn>
-              <p:prevCondLst>
-                <p:cond evt="onPrev" delay="0">
-                  <p:tgtEl>
-                    <p:sldTgt/>
-                  </p:tgtEl>
-                </p:cond>
-              </p:prevCondLst>
-              <p:nextCondLst>
-                <p:cond evt="onNext" delay="0">
-                  <p:tgtEl>
-                    <p:sldTgt/>
-                  </p:tgtEl>
-                </p:cond>
-              </p:nextCondLst>
-            </p:seq>
-          </p:childTnLst>
-        </p:cTn>
-      </p:par>
-    </p:tnLst>
-  </p:timing>
-</p:sld>
-</file>
-
-<file path=ppt/slides/slide20.xml><?xml version="1.0" encoding="utf-8"?>
-<p:sld xmlns:a="http://schemas.openxmlformats.org/drawingml/2006/main" xmlns:r="http://schemas.openxmlformats.org/officeDocument/2006/relationships" xmlns:p="http://schemas.openxmlformats.org/presentationml/2006/main">
-  <p:cSld>
-    <p:spTree>
-      <p:nvGrpSpPr>
-        <p:cNvPr id="1" name=""/>
-        <p:cNvGrpSpPr/>
-        <p:nvPr/>
-      </p:nvGrpSpPr>
-      <p:grpSpPr>
-        <a:xfrm>
-          <a:off x="0" y="0"/>
-          <a:ext cx="0" cy="0"/>
-          <a:chOff x="0" y="0"/>
-          <a:chExt cx="0" cy="0"/>
-        </a:xfrm>
-      </p:grpSpPr>
-      <p:sp>
-        <p:nvSpPr>
           <p:cNvPr id="2" name="Title 1"/>
           <p:cNvSpPr>
             <a:spLocks noGrp="1"/>
@@ -8691,9 +9576,6 @@
               </a:rPr>
               <a:t>range(1, 100)</a:t>
             </a:r>
-            <a:endParaRPr lang="en-US" dirty="0" smtClean="0">
-              <a:latin typeface="Consolas" panose="020B0609020204030204" pitchFamily="49" charset="0"/>
-            </a:endParaRPr>
           </a:p>
         </p:txBody>
       </p:sp>
@@ -9156,6 +10038,107 @@
 </p:sld>
 </file>
 
+<file path=ppt/slides/slide22.xml><?xml version="1.0" encoding="utf-8"?>
+<p:sld xmlns:a="http://schemas.openxmlformats.org/drawingml/2006/main" xmlns:r="http://schemas.openxmlformats.org/officeDocument/2006/relationships" xmlns:p="http://schemas.openxmlformats.org/presentationml/2006/main">
+  <p:cSld>
+    <p:spTree>
+      <p:nvGrpSpPr>
+        <p:cNvPr id="1" name=""/>
+        <p:cNvGrpSpPr/>
+        <p:nvPr/>
+      </p:nvGrpSpPr>
+      <p:grpSpPr>
+        <a:xfrm>
+          <a:off x="0" y="0"/>
+          <a:ext cx="0" cy="0"/>
+          <a:chOff x="0" y="0"/>
+          <a:chExt cx="0" cy="0"/>
+        </a:xfrm>
+      </p:grpSpPr>
+      <p:sp>
+        <p:nvSpPr>
+          <p:cNvPr id="2" name="Title 1"/>
+          <p:cNvSpPr>
+            <a:spLocks noGrp="1"/>
+          </p:cNvSpPr>
+          <p:nvPr>
+            <p:ph type="title"/>
+          </p:nvPr>
+        </p:nvSpPr>
+        <p:spPr/>
+        <p:txBody>
+          <a:bodyPr/>
+          <a:lstStyle/>
+          <a:p>
+            <a:r>
+              <a:rPr lang="en-US" dirty="0" smtClean="0"/>
+              <a:t>Boilerplate</a:t>
+            </a:r>
+            <a:endParaRPr lang="en-US" dirty="0"/>
+          </a:p>
+        </p:txBody>
+      </p:sp>
+      <p:pic>
+        <p:nvPicPr>
+          <p:cNvPr id="1028" name="Picture 4" descr="http://davelandweb.com/knotts/images/70s/EkTPBKBC_10_70_N12B2.jpg"/>
+          <p:cNvPicPr>
+            <a:picLocks noChangeAspect="1" noChangeArrowheads="1"/>
+          </p:cNvPicPr>
+          <p:nvPr/>
+        </p:nvPicPr>
+        <p:blipFill>
+          <a:blip r:embed="rId2">
+            <a:extLst>
+              <a:ext uri="{28A0092B-C50C-407E-A947-70E740481C1C}">
+                <a14:useLocalDpi xmlns:a14="http://schemas.microsoft.com/office/drawing/2010/main" val="0"/>
+              </a:ext>
+            </a:extLst>
+          </a:blip>
+          <a:srcRect/>
+          <a:stretch>
+            <a:fillRect/>
+          </a:stretch>
+        </p:blipFill>
+        <p:spPr bwMode="auto">
+          <a:xfrm>
+            <a:off x="838200" y="1690688"/>
+            <a:ext cx="6176440" cy="4083314"/>
+          </a:xfrm>
+          <a:prstGeom prst="rect">
+            <a:avLst/>
+          </a:prstGeom>
+          <a:noFill/>
+          <a:extLst>
+            <a:ext uri="{909E8E84-426E-40DD-AFC4-6F175D3DCCD1}">
+              <a14:hiddenFill xmlns:a14="http://schemas.microsoft.com/office/drawing/2010/main">
+                <a:solidFill>
+                  <a:srgbClr val="FFFFFF"/>
+                </a:solidFill>
+              </a14:hiddenFill>
+            </a:ext>
+          </a:extLst>
+        </p:spPr>
+      </p:pic>
+    </p:spTree>
+    <p:extLst>
+      <p:ext uri="{BB962C8B-B14F-4D97-AF65-F5344CB8AC3E}">
+        <p14:creationId xmlns:p14="http://schemas.microsoft.com/office/powerpoint/2010/main" val="1296629721"/>
+      </p:ext>
+    </p:extLst>
+  </p:cSld>
+  <p:clrMapOvr>
+    <a:masterClrMapping/>
+  </p:clrMapOvr>
+  <p:timing>
+    <p:tnLst>
+      <p:par>
+        <p:cTn id="1" dur="indefinite" restart="never" nodeType="tmRoot"/>
+      </p:par>
+    </p:tnLst>
+  </p:timing>
+</p:sld>
+</file>
+
 <file path=ppt/slides/slide3.xml><?xml version="1.0" encoding="utf-8"?>
 <p:sld xmlns:a="http://schemas.openxmlformats.org/drawingml/2006/main" xmlns:r="http://schemas.openxmlformats.org/officeDocument/2006/relationships" xmlns:p="http://schemas.openxmlformats.org/presentationml/2006/main">
   <p:cSld>
@@ -9190,15 +10173,7 @@
           <a:p>
             <a:r>
               <a:rPr lang="en-US" dirty="0" smtClean="0"/>
-              <a:t>The three rules of </a:t>
-            </a:r>
-            <a:r>
-              <a:rPr lang="en-US" dirty="0" smtClean="0"/>
-              <a:t>plugin </a:t>
-            </a:r>
-            <a:r>
-              <a:rPr lang="en-US" dirty="0" smtClean="0"/>
-              <a:t>APIs</a:t>
+              <a:t>The three rules of plugin APIs</a:t>
             </a:r>
             <a:endParaRPr lang="en-US" dirty="0"/>
           </a:p>
@@ -10387,23 +11362,30 @@
               <a:rPr lang="en-US" dirty="0" err="1" smtClean="0"/>
               <a:t>VSCode</a:t>
             </a:r>
+            <a:endParaRPr lang="en-US" dirty="0" smtClean="0"/>
+          </a:p>
+          <a:p>
+            <a:pPr lvl="1"/>
             <a:r>
               <a:rPr lang="en-US" dirty="0" smtClean="0"/>
-              <a:t> and IntelliJ</a:t>
-            </a:r>
-          </a:p>
-          <a:p>
-            <a:pPr lvl="1"/>
+              <a:t>Static sockets, dynamic plugs</a:t>
+            </a:r>
+            <a:endParaRPr lang="en-US" dirty="0" smtClean="0"/>
+          </a:p>
+          <a:p>
             <a:r>
               <a:rPr lang="en-US" dirty="0" smtClean="0"/>
-              <a:t>Fixed sockets, dynamic plugs</a:t>
-            </a:r>
-          </a:p>
-          <a:p>
+              <a:t>Build </a:t>
+            </a:r>
             <a:r>
               <a:rPr lang="en-US" dirty="0" smtClean="0"/>
-              <a:t>Build a calculator in Eclipse</a:t>
-            </a:r>
+              <a:t>a calculator in </a:t>
+            </a:r>
+            <a:r>
+              <a:rPr lang="en-US" dirty="0" smtClean="0"/>
+              <a:t>IntelliJ and Eclipse</a:t>
+            </a:r>
+            <a:endParaRPr lang="en-US" dirty="0" smtClean="0"/>
           </a:p>
           <a:p>
             <a:pPr lvl="1"/>
@@ -10411,7 +11393,6 @@
               <a:rPr lang="en-US" dirty="0" smtClean="0"/>
               <a:t>Dynamic sockets, dynamic plugs</a:t>
             </a:r>
-            <a:endParaRPr lang="en-US" dirty="0" smtClean="0"/>
           </a:p>
           <a:p>
             <a:r>
@@ -10434,15 +11415,7 @@
           <a:p>
             <a:r>
               <a:rPr lang="en-US" dirty="0" smtClean="0"/>
-              <a:t>Propose </a:t>
-            </a:r>
-            <a:r>
-              <a:rPr lang="en-US" dirty="0" smtClean="0"/>
-              <a:t>a system with the best of all </a:t>
-            </a:r>
-            <a:r>
-              <a:rPr lang="en-US" dirty="0" smtClean="0"/>
-              <a:t>worlds</a:t>
+              <a:t>Propose a system with the best of all worlds</a:t>
             </a:r>
           </a:p>
           <a:p>
@@ -10516,15 +11489,33 @@
                                   </p:childTnLst>
                                 </p:cTn>
                               </p:par>
+                            </p:childTnLst>
+                          </p:cTn>
+                        </p:par>
+                      </p:childTnLst>
+                    </p:cTn>
+                  </p:par>
+                  <p:par>
+                    <p:cTn id="7" fill="hold">
+                      <p:stCondLst>
+                        <p:cond delay="indefinite"/>
+                      </p:stCondLst>
+                      <p:childTnLst>
+                        <p:par>
+                          <p:cTn id="8" fill="hold">
+                            <p:stCondLst>
+                              <p:cond delay="0"/>
+                            </p:stCondLst>
+                            <p:childTnLst>
                               <p:par>
-                                <p:cTn id="7" presetID="1" presetClass="entr" presetSubtype="0" fill="hold" nodeType="withEffect">
+                                <p:cTn id="9" presetID="1" presetClass="entr" presetSubtype="0" fill="hold" nodeType="clickEffect">
                                   <p:stCondLst>
                                     <p:cond delay="0"/>
                                   </p:stCondLst>
                                   <p:childTnLst>
                                     <p:set>
                                       <p:cBhvr>
-                                        <p:cTn id="8" dur="1" fill="hold">
+                                        <p:cTn id="10" dur="1" fill="hold">
                                           <p:stCondLst>
                                             <p:cond delay="0"/>
                                           </p:stCondLst>
@@ -10554,26 +11545,26 @@
                     </p:cTn>
                   </p:par>
                   <p:par>
-                    <p:cTn id="9" fill="hold">
+                    <p:cTn id="11" fill="hold">
                       <p:stCondLst>
                         <p:cond delay="indefinite"/>
                       </p:stCondLst>
                       <p:childTnLst>
                         <p:par>
-                          <p:cTn id="10" fill="hold">
+                          <p:cTn id="12" fill="hold">
                             <p:stCondLst>
                               <p:cond delay="0"/>
                             </p:stCondLst>
                             <p:childTnLst>
                               <p:par>
-                                <p:cTn id="11" presetID="1" presetClass="entr" presetSubtype="0" fill="hold" nodeType="clickEffect">
+                                <p:cTn id="13" presetID="1" presetClass="entr" presetSubtype="0" fill="hold" nodeType="clickEffect">
                                   <p:stCondLst>
                                     <p:cond delay="0"/>
                                   </p:stCondLst>
                                   <p:childTnLst>
                                     <p:set>
                                       <p:cBhvr>
-                                        <p:cTn id="12" dur="1" fill="hold">
+                                        <p:cTn id="14" dur="1" fill="hold">
                                           <p:stCondLst>
                                             <p:cond delay="0"/>
                                           </p:stCondLst>
@@ -10597,14 +11588,14 @@
                                 </p:cTn>
                               </p:par>
                               <p:par>
-                                <p:cTn id="13" presetID="1" presetClass="entr" presetSubtype="0" fill="hold" nodeType="withEffect">
+                                <p:cTn id="15" presetID="1" presetClass="entr" presetSubtype="0" fill="hold" nodeType="withEffect">
                                   <p:stCondLst>
                                     <p:cond delay="0"/>
                                   </p:stCondLst>
                                   <p:childTnLst>
                                     <p:set>
                                       <p:cBhvr>
-                                        <p:cTn id="14" dur="1" fill="hold">
+                                        <p:cTn id="16" dur="1" fill="hold">
                                           <p:stCondLst>
                                             <p:cond delay="0"/>
                                           </p:stCondLst>
@@ -10634,26 +11625,26 @@
                     </p:cTn>
                   </p:par>
                   <p:par>
-                    <p:cTn id="15" fill="hold">
+                    <p:cTn id="17" fill="hold">
                       <p:stCondLst>
                         <p:cond delay="indefinite"/>
                       </p:stCondLst>
                       <p:childTnLst>
                         <p:par>
-                          <p:cTn id="16" fill="hold">
+                          <p:cTn id="18" fill="hold">
                             <p:stCondLst>
                               <p:cond delay="0"/>
                             </p:stCondLst>
                             <p:childTnLst>
                               <p:par>
-                                <p:cTn id="17" presetID="1" presetClass="entr" presetSubtype="0" fill="hold" nodeType="clickEffect">
+                                <p:cTn id="19" presetID="1" presetClass="entr" presetSubtype="0" fill="hold" nodeType="clickEffect">
                                   <p:stCondLst>
                                     <p:cond delay="0"/>
                                   </p:stCondLst>
                                   <p:childTnLst>
                                     <p:set>
                                       <p:cBhvr>
-                                        <p:cTn id="18" dur="1" fill="hold">
+                                        <p:cTn id="20" dur="1" fill="hold">
                                           <p:stCondLst>
                                             <p:cond delay="0"/>
                                           </p:stCondLst>
@@ -10677,14 +11668,14 @@
                                 </p:cTn>
                               </p:par>
                               <p:par>
-                                <p:cTn id="19" presetID="1" presetClass="entr" presetSubtype="0" fill="hold" nodeType="withEffect">
+                                <p:cTn id="21" presetID="1" presetClass="entr" presetSubtype="0" fill="hold" nodeType="withEffect">
                                   <p:stCondLst>
                                     <p:cond delay="0"/>
                                   </p:stCondLst>
                                   <p:childTnLst>
                                     <p:set>
                                       <p:cBhvr>
-                                        <p:cTn id="20" dur="1" fill="hold">
+                                        <p:cTn id="22" dur="1" fill="hold">
                                           <p:stCondLst>
                                             <p:cond delay="0"/>
                                           </p:stCondLst>
@@ -10714,26 +11705,26 @@
                     </p:cTn>
                   </p:par>
                   <p:par>
-                    <p:cTn id="21" fill="hold">
+                    <p:cTn id="23" fill="hold">
                       <p:stCondLst>
                         <p:cond delay="indefinite"/>
                       </p:stCondLst>
                       <p:childTnLst>
                         <p:par>
-                          <p:cTn id="22" fill="hold">
+                          <p:cTn id="24" fill="hold">
                             <p:stCondLst>
                               <p:cond delay="0"/>
                             </p:stCondLst>
                             <p:childTnLst>
                               <p:par>
-                                <p:cTn id="23" presetID="1" presetClass="entr" presetSubtype="0" fill="hold" nodeType="clickEffect">
+                                <p:cTn id="25" presetID="1" presetClass="entr" presetSubtype="0" fill="hold" nodeType="clickEffect">
                                   <p:stCondLst>
                                     <p:cond delay="0"/>
                                   </p:stCondLst>
                                   <p:childTnLst>
                                     <p:set>
                                       <p:cBhvr>
-                                        <p:cTn id="24" dur="1" fill="hold">
+                                        <p:cTn id="26" dur="1" fill="hold">
                                           <p:stCondLst>
                                             <p:cond delay="0"/>
                                           </p:stCondLst>
@@ -10757,14 +11748,14 @@
                                 </p:cTn>
                               </p:par>
                               <p:par>
-                                <p:cTn id="25" presetID="1" presetClass="entr" presetSubtype="0" fill="hold" nodeType="withEffect">
+                                <p:cTn id="27" presetID="1" presetClass="entr" presetSubtype="0" fill="hold" nodeType="withEffect">
                                   <p:stCondLst>
                                     <p:cond delay="0"/>
                                   </p:stCondLst>
                                   <p:childTnLst>
                                     <p:set>
                                       <p:cBhvr>
-                                        <p:cTn id="26" dur="1" fill="hold">
+                                        <p:cTn id="28" dur="1" fill="hold">
                                           <p:stCondLst>
                                             <p:cond delay="0"/>
                                           </p:stCondLst>

</xml_diff>